<commit_message>
changes to presentation ppt
</commit_message>
<xml_diff>
--- a/Presentation1.pptx
+++ b/Presentation1.pptx
@@ -2,7 +2,7 @@
 <file path=ppt/presentation.xml><?xml version="1.0" encoding="utf-8"?>
 <p:presentation xmlns:a="http://schemas.openxmlformats.org/drawingml/2006/main" xmlns:r="http://schemas.openxmlformats.org/officeDocument/2006/relationships" xmlns:p="http://schemas.openxmlformats.org/presentationml/2006/main" saveSubsetFonts="1" autoCompressPictures="0">
   <p:sldMasterIdLst>
-    <p:sldMasterId id="2147483648" r:id="rId1"/>
+    <p:sldMasterId id="2147483816" r:id="rId1"/>
   </p:sldMasterIdLst>
   <p:notesMasterIdLst>
     <p:notesMasterId r:id="rId10"/>
@@ -114,6 +114,11 @@
       </a:defRPr>
     </a:lvl9pPr>
   </p:defaultTextStyle>
+  <p:extLst>
+    <p:ext uri="{EFAFB233-063F-42B5-8137-9DF3F51BA10A}">
+      <p15:sldGuideLst xmlns:p15="http://schemas.microsoft.com/office/powerpoint/2012/main"/>
+    </p:ext>
+  </p:extLst>
 </p:presentation>
 </file>
 
@@ -265,7 +270,7 @@
                   <c:v>11.03057291584346</c:v>
                 </c:pt>
                 <c:pt idx="27">
-                  <c:v>11.45786754821349</c:v>
+                  <c:v>11.4578675482135</c:v>
                 </c:pt>
                 <c:pt idx="28">
                   <c:v>10.26969591411043</c:v>
@@ -346,7 +351,7 @@
                   <c:v>15.57850325804484</c:v>
                 </c:pt>
                 <c:pt idx="54">
-                  <c:v>42.10641594312908</c:v>
+                  <c:v>42.1064159431291</c:v>
                 </c:pt>
                 <c:pt idx="55">
                   <c:v>42.58524225201973</c:v>
@@ -565,11 +570,11 @@
           <c:showPercent val="0"/>
           <c:showBubbleSize val="0"/>
         </c:dLbls>
-        <c:axId val="365885648"/>
-        <c:axId val="368968448"/>
+        <c:axId val="-459098224"/>
+        <c:axId val="-459117072"/>
       </c:scatterChart>
       <c:valAx>
-        <c:axId val="365885648"/>
+        <c:axId val="-459098224"/>
         <c:scaling>
           <c:orientation val="minMax"/>
         </c:scaling>
@@ -626,12 +631,12 @@
             <a:endParaRPr lang="en-US"/>
           </a:p>
         </c:txPr>
-        <c:crossAx val="368968448"/>
+        <c:crossAx val="-459117072"/>
         <c:crosses val="autoZero"/>
         <c:crossBetween val="midCat"/>
       </c:valAx>
       <c:valAx>
-        <c:axId val="368968448"/>
+        <c:axId val="-459117072"/>
         <c:scaling>
           <c:orientation val="minMax"/>
         </c:scaling>
@@ -651,6 +656,7 @@
             <a:effectLst/>
           </c:spPr>
         </c:majorGridlines>
+        <c:numFmt formatCode="0.0" sourceLinked="0"/>
         <c:majorTickMark val="none"/>
         <c:minorTickMark val="none"/>
         <c:tickLblPos val="nextTo"/>
@@ -687,7 +693,7 @@
             <a:endParaRPr lang="en-US"/>
           </a:p>
         </c:txPr>
-        <c:crossAx val="365885648"/>
+        <c:crossAx val="-459098224"/>
         <c:crosses val="autoZero"/>
         <c:crossBetween val="midCat"/>
       </c:valAx>
@@ -1174,11 +1180,11 @@
           <c:showPercent val="0"/>
           <c:showBubbleSize val="0"/>
         </c:dLbls>
-        <c:axId val="439821792"/>
-        <c:axId val="439825088"/>
+        <c:axId val="-491537888"/>
+        <c:axId val="-491535568"/>
       </c:scatterChart>
       <c:valAx>
-        <c:axId val="439821792"/>
+        <c:axId val="-491537888"/>
         <c:scaling>
           <c:orientation val="minMax"/>
         </c:scaling>
@@ -1235,12 +1241,12 @@
             <a:endParaRPr lang="en-US"/>
           </a:p>
         </c:txPr>
-        <c:crossAx val="439825088"/>
+        <c:crossAx val="-491535568"/>
         <c:crosses val="autoZero"/>
         <c:crossBetween val="midCat"/>
       </c:valAx>
       <c:valAx>
-        <c:axId val="439825088"/>
+        <c:axId val="-491535568"/>
         <c:scaling>
           <c:orientation val="minMax"/>
         </c:scaling>
@@ -1297,7 +1303,7 @@
             <a:endParaRPr lang="en-US"/>
           </a:p>
         </c:txPr>
-        <c:crossAx val="439821792"/>
+        <c:crossAx val="-491537888"/>
         <c:crosses val="autoZero"/>
         <c:crossBetween val="midCat"/>
       </c:valAx>
@@ -2530,7 +2536,7 @@
           <a:p>
             <a:fld id="{5F3A9A27-49B0-394A-9AD3-9D6607DD3EB3}" type="datetimeFigureOut">
               <a:rPr lang="en-US" smtClean="0"/>
-              <a:t>12/1/16</a:t>
+              <a:t>12/4/16</a:t>
             </a:fld>
             <a:endParaRPr lang="en-US"/>
           </a:p>
@@ -2799,7 +2805,7 @@
 </file>
 
 <file path=ppt/slideLayouts/slideLayout1.xml><?xml version="1.0" encoding="utf-8"?>
-<p:sldLayout xmlns:a="http://schemas.openxmlformats.org/drawingml/2006/main" xmlns:r="http://schemas.openxmlformats.org/officeDocument/2006/relationships" xmlns:p="http://schemas.openxmlformats.org/presentationml/2006/main" type="title" preserve="1">
+<p:sldLayout xmlns:a="http://schemas.openxmlformats.org/drawingml/2006/main" xmlns:r="http://schemas.openxmlformats.org/officeDocument/2006/relationships" xmlns:p="http://schemas.openxmlformats.org/presentationml/2006/main" showMasterSp="0" type="title" preserve="1">
   <p:cSld name="Title Slide">
     <p:spTree>
       <p:nvGrpSpPr>
@@ -2817,6 +2823,359 @@
       </p:grpSpPr>
       <p:sp>
         <p:nvSpPr>
+          <p:cNvPr id="7" name="Rectangle 6"/>
+          <p:cNvSpPr/>
+          <p:nvPr/>
+        </p:nvSpPr>
+        <p:spPr>
+          <a:xfrm>
+            <a:off x="920834" y="1346946"/>
+            <a:ext cx="10222992" cy="80683"/>
+          </a:xfrm>
+          <a:prstGeom prst="rect">
+            <a:avLst/>
+          </a:prstGeom>
+          <a:blipFill dpi="0" rotWithShape="1">
+            <a:blip r:embed="rId2">
+              <a:alphaModFix amt="85000"/>
+              <a:lum bright="70000" contrast="-70000"/>
+              <a:extLst>
+                <a:ext uri="{BEBA8EAE-BF5A-486C-A8C5-ECC9F3942E4B}">
+                  <a14:imgProps xmlns:a14="http://schemas.microsoft.com/office/drawing/2010/main">
+                    <a14:imgLayer r:embed="rId3">
+                      <a14:imgEffect>
+                        <a14:sharpenSoften amount="61000"/>
+                      </a14:imgEffect>
+                    </a14:imgLayer>
+                  </a14:imgProps>
+                </a:ext>
+                <a:ext uri="{28A0092B-C50C-407E-A947-70E740481C1C}">
+                  <a14:useLocalDpi xmlns:a14="http://schemas.microsoft.com/office/drawing/2010/main" val="0"/>
+                </a:ext>
+              </a:extLst>
+            </a:blip>
+            <a:srcRect/>
+            <a:tile tx="0" ty="-762000" sx="92000" sy="89000" flip="xy" algn="ctr"/>
+          </a:blipFill>
+          <a:ln>
+            <a:noFill/>
+          </a:ln>
+        </p:spPr>
+        <p:style>
+          <a:lnRef idx="2">
+            <a:schemeClr val="accent1">
+              <a:shade val="50000"/>
+            </a:schemeClr>
+          </a:lnRef>
+          <a:fillRef idx="1">
+            <a:schemeClr val="accent1"/>
+          </a:fillRef>
+          <a:effectRef idx="0">
+            <a:schemeClr val="accent1"/>
+          </a:effectRef>
+          <a:fontRef idx="minor">
+            <a:schemeClr val="lt1"/>
+          </a:fontRef>
+        </p:style>
+        <p:txBody>
+          <a:bodyPr rtlCol="0" anchor="ctr"/>
+          <a:lstStyle/>
+          <a:p>
+            <a:pPr algn="ctr"/>
+            <a:endParaRPr lang="en-US"/>
+          </a:p>
+        </p:txBody>
+      </p:sp>
+      <p:sp>
+        <p:nvSpPr>
+          <p:cNvPr id="8" name="Rectangle 7"/>
+          <p:cNvSpPr/>
+          <p:nvPr/>
+        </p:nvSpPr>
+        <p:spPr>
+          <a:xfrm>
+            <a:off x="920834" y="4299696"/>
+            <a:ext cx="10222992" cy="80683"/>
+          </a:xfrm>
+          <a:prstGeom prst="rect">
+            <a:avLst/>
+          </a:prstGeom>
+          <a:blipFill dpi="0" rotWithShape="1">
+            <a:blip r:embed="rId2">
+              <a:alphaModFix amt="85000"/>
+              <a:lum bright="70000" contrast="-70000"/>
+              <a:extLst>
+                <a:ext uri="{BEBA8EAE-BF5A-486C-A8C5-ECC9F3942E4B}">
+                  <a14:imgProps xmlns:a14="http://schemas.microsoft.com/office/drawing/2010/main">
+                    <a14:imgLayer r:embed="rId3">
+                      <a14:imgEffect>
+                        <a14:sharpenSoften amount="61000"/>
+                      </a14:imgEffect>
+                    </a14:imgLayer>
+                  </a14:imgProps>
+                </a:ext>
+                <a:ext uri="{28A0092B-C50C-407E-A947-70E740481C1C}">
+                  <a14:useLocalDpi xmlns:a14="http://schemas.microsoft.com/office/drawing/2010/main" val="0"/>
+                </a:ext>
+              </a:extLst>
+            </a:blip>
+            <a:srcRect/>
+            <a:tile tx="0" ty="-717550" sx="92000" sy="89000" flip="xy" algn="ctr"/>
+          </a:blipFill>
+          <a:ln>
+            <a:noFill/>
+          </a:ln>
+        </p:spPr>
+        <p:style>
+          <a:lnRef idx="2">
+            <a:schemeClr val="accent1">
+              <a:shade val="50000"/>
+            </a:schemeClr>
+          </a:lnRef>
+          <a:fillRef idx="1">
+            <a:schemeClr val="accent1"/>
+          </a:fillRef>
+          <a:effectRef idx="0">
+            <a:schemeClr val="accent1"/>
+          </a:effectRef>
+          <a:fontRef idx="minor">
+            <a:schemeClr val="lt1"/>
+          </a:fontRef>
+        </p:style>
+        <p:txBody>
+          <a:bodyPr rtlCol="0" anchor="ctr"/>
+          <a:lstStyle/>
+          <a:p>
+            <a:pPr algn="ctr"/>
+            <a:endParaRPr lang="en-US"/>
+          </a:p>
+        </p:txBody>
+      </p:sp>
+      <p:sp>
+        <p:nvSpPr>
+          <p:cNvPr id="9" name="Rectangle 8"/>
+          <p:cNvSpPr/>
+          <p:nvPr/>
+        </p:nvSpPr>
+        <p:spPr>
+          <a:xfrm>
+            <a:off x="920834" y="1484779"/>
+            <a:ext cx="10222992" cy="2743200"/>
+          </a:xfrm>
+          <a:prstGeom prst="rect">
+            <a:avLst/>
+          </a:prstGeom>
+          <a:blipFill dpi="0" rotWithShape="1">
+            <a:blip r:embed="rId2">
+              <a:alphaModFix amt="85000"/>
+              <a:lum bright="70000" contrast="-70000"/>
+              <a:extLst>
+                <a:ext uri="{BEBA8EAE-BF5A-486C-A8C5-ECC9F3942E4B}">
+                  <a14:imgProps xmlns:a14="http://schemas.microsoft.com/office/drawing/2010/main">
+                    <a14:imgLayer r:embed="rId3">
+                      <a14:imgEffect>
+                        <a14:sharpenSoften amount="61000"/>
+                      </a14:imgEffect>
+                    </a14:imgLayer>
+                  </a14:imgProps>
+                </a:ext>
+                <a:ext uri="{28A0092B-C50C-407E-A947-70E740481C1C}">
+                  <a14:useLocalDpi xmlns:a14="http://schemas.microsoft.com/office/drawing/2010/main" val="0"/>
+                </a:ext>
+              </a:extLst>
+            </a:blip>
+            <a:srcRect/>
+            <a:tile tx="0" ty="-704850" sx="92000" sy="89000" flip="xy" algn="ctr"/>
+          </a:blipFill>
+          <a:ln>
+            <a:noFill/>
+          </a:ln>
+        </p:spPr>
+        <p:style>
+          <a:lnRef idx="2">
+            <a:schemeClr val="accent1">
+              <a:shade val="50000"/>
+            </a:schemeClr>
+          </a:lnRef>
+          <a:fillRef idx="1">
+            <a:schemeClr val="accent1"/>
+          </a:fillRef>
+          <a:effectRef idx="0">
+            <a:schemeClr val="accent1"/>
+          </a:effectRef>
+          <a:fontRef idx="minor">
+            <a:schemeClr val="lt1"/>
+          </a:fontRef>
+        </p:style>
+        <p:txBody>
+          <a:bodyPr rtlCol="0" anchor="ctr"/>
+          <a:lstStyle/>
+          <a:p>
+            <a:pPr algn="ctr"/>
+            <a:endParaRPr lang="en-US"/>
+          </a:p>
+        </p:txBody>
+      </p:sp>
+      <p:grpSp>
+        <p:nvGrpSpPr>
+          <p:cNvPr id="10" name="Group 9"/>
+          <p:cNvGrpSpPr/>
+          <p:nvPr/>
+        </p:nvGrpSpPr>
+        <p:grpSpPr>
+          <a:xfrm>
+            <a:off x="9649215" y="4068923"/>
+            <a:ext cx="1080904" cy="1080902"/>
+            <a:chOff x="9685338" y="4460675"/>
+            <a:chExt cx="1080904" cy="1080902"/>
+          </a:xfrm>
+        </p:grpSpPr>
+        <p:sp>
+          <p:nvSpPr>
+            <p:cNvPr id="11" name="Oval 10"/>
+            <p:cNvSpPr/>
+            <p:nvPr/>
+          </p:nvSpPr>
+          <p:spPr>
+            <a:xfrm>
+              <a:off x="9685338" y="4460675"/>
+              <a:ext cx="1080904" cy="1080902"/>
+            </a:xfrm>
+            <a:prstGeom prst="ellipse">
+              <a:avLst/>
+            </a:prstGeom>
+            <a:blipFill dpi="0" rotWithShape="1">
+              <a:blip r:embed="rId4">
+                <a:duotone>
+                  <a:schemeClr val="accent1">
+                    <a:shade val="45000"/>
+                    <a:satMod val="135000"/>
+                  </a:schemeClr>
+                  <a:prstClr val="white"/>
+                </a:duotone>
+                <a:extLst>
+                  <a:ext uri="{BEBA8EAE-BF5A-486C-A8C5-ECC9F3942E4B}">
+                    <a14:imgProps xmlns:a14="http://schemas.microsoft.com/office/drawing/2010/main">
+                      <a14:imgLayer r:embed="rId5">
+                        <a14:imgEffect>
+                          <a14:saturation sat="95000"/>
+                        </a14:imgEffect>
+                      </a14:imgLayer>
+                    </a14:imgProps>
+                  </a:ext>
+                </a:extLst>
+              </a:blip>
+              <a:srcRect/>
+              <a:tile tx="0" ty="0" sx="85000" sy="85000" flip="none" algn="tl"/>
+            </a:blipFill>
+            <a:ln w="25400" cap="flat" cmpd="sng" algn="ctr">
+              <a:noFill/>
+              <a:prstDash val="solid"/>
+            </a:ln>
+            <a:effectLst/>
+          </p:spPr>
+          <p:txBody>
+            <a:bodyPr lIns="0" tIns="0" rIns="0" bIns="0" rtlCol="0" anchor="ctr"/>
+            <a:lstStyle/>
+            <a:p>
+              <a:pPr marL="0" marR="0" lvl="0" indent="0" algn="ctr" defTabSz="914400" eaLnBrk="1" fontAlgn="auto" latinLnBrk="0" hangingPunct="1">
+                <a:lnSpc>
+                  <a:spcPct val="100000"/>
+                </a:lnSpc>
+                <a:spcBef>
+                  <a:spcPts val="0"/>
+                </a:spcBef>
+                <a:spcAft>
+                  <a:spcPts val="0"/>
+                </a:spcAft>
+                <a:buClrTx/>
+                <a:buSzTx/>
+                <a:buFontTx/>
+                <a:buNone/>
+                <a:tabLst/>
+                <a:defRPr/>
+              </a:pPr>
+              <a:endParaRPr kumimoji="0" lang="en-US" sz="2000" b="0" i="0" u="none" strike="noStrike" kern="0" cap="none" spc="0" normalizeH="0" baseline="0" noProof="0" dirty="0">
+                <a:ln>
+                  <a:noFill/>
+                </a:ln>
+                <a:solidFill>
+                  <a:prstClr val="white"/>
+                </a:solidFill>
+                <a:effectLst/>
+                <a:uLnTx/>
+                <a:uFillTx/>
+                <a:latin typeface="Rockwell Extra Bold" pitchFamily="18" charset="0"/>
+                <a:ea typeface="+mn-ea"/>
+                <a:cs typeface="+mn-cs"/>
+              </a:endParaRPr>
+            </a:p>
+          </p:txBody>
+        </p:sp>
+        <p:sp>
+          <p:nvSpPr>
+            <p:cNvPr id="12" name="Oval 11"/>
+            <p:cNvSpPr/>
+            <p:nvPr/>
+          </p:nvSpPr>
+          <p:spPr>
+            <a:xfrm>
+              <a:off x="9793429" y="4568765"/>
+              <a:ext cx="864723" cy="864722"/>
+            </a:xfrm>
+            <a:prstGeom prst="ellipse">
+              <a:avLst/>
+            </a:prstGeom>
+            <a:noFill/>
+            <a:ln w="25400" cap="flat" cmpd="sng" algn="ctr">
+              <a:solidFill>
+                <a:sysClr val="window" lastClr="FFFFFF"/>
+              </a:solidFill>
+              <a:prstDash val="solid"/>
+            </a:ln>
+            <a:effectLst/>
+          </p:spPr>
+          <p:txBody>
+            <a:bodyPr rtlCol="0" anchor="ctr"/>
+            <a:lstStyle/>
+            <a:p>
+              <a:pPr marL="0" marR="0" lvl="0" indent="0" algn="ctr" defTabSz="914400" eaLnBrk="1" fontAlgn="auto" latinLnBrk="0" hangingPunct="1">
+                <a:lnSpc>
+                  <a:spcPct val="100000"/>
+                </a:lnSpc>
+                <a:spcBef>
+                  <a:spcPts val="0"/>
+                </a:spcBef>
+                <a:spcAft>
+                  <a:spcPts val="0"/>
+                </a:spcAft>
+                <a:buClrTx/>
+                <a:buSzTx/>
+                <a:buFontTx/>
+                <a:buNone/>
+                <a:tabLst/>
+                <a:defRPr/>
+              </a:pPr>
+              <a:endParaRPr kumimoji="0" lang="en-US" sz="1800" b="0" i="0" u="none" strike="noStrike" kern="0" cap="none" spc="0" normalizeH="0" baseline="0" noProof="0" dirty="0">
+                <a:ln>
+                  <a:noFill/>
+                </a:ln>
+                <a:solidFill>
+                  <a:prstClr val="white"/>
+                </a:solidFill>
+                <a:effectLst/>
+                <a:uLnTx/>
+                <a:uFillTx/>
+                <a:latin typeface="Calibri"/>
+                <a:ea typeface="+mn-ea"/>
+                <a:cs typeface="+mn-cs"/>
+              </a:endParaRPr>
+            </a:p>
+          </p:txBody>
+        </p:sp>
+      </p:grpSp>
+      <p:sp>
+        <p:nvSpPr>
           <p:cNvPr id="2" name="Title 1"/>
           <p:cNvSpPr>
             <a:spLocks noGrp="1"/>
@@ -2827,15 +3186,26 @@
         </p:nvSpPr>
         <p:spPr>
           <a:xfrm>
-            <a:off x="1524000" y="1122363"/>
-            <a:ext cx="9144000" cy="2387600"/>
+            <a:off x="1051560" y="1432223"/>
+            <a:ext cx="9966960" cy="3035808"/>
           </a:xfrm>
         </p:spPr>
         <p:txBody>
-          <a:bodyPr anchor="b"/>
+          <a:bodyPr anchor="ctr">
+            <a:noAutofit/>
+          </a:bodyPr>
           <a:lstStyle>
-            <a:lvl1pPr algn="ctr">
-              <a:defRPr sz="6000"/>
+            <a:lvl1pPr algn="l">
+              <a:lnSpc>
+                <a:spcPct val="80000"/>
+              </a:lnSpc>
+              <a:defRPr sz="9600" cap="all" baseline="0">
+                <a:blipFill dpi="0" rotWithShape="1">
+                  <a:blip r:embed="rId4"/>
+                  <a:srcRect/>
+                  <a:tile tx="6350" ty="-127000" sx="65000" sy="64000" flip="none" algn="tl"/>
+                </a:blipFill>
+              </a:defRPr>
             </a:lvl1pPr>
           </a:lstStyle>
           <a:p>
@@ -2843,7 +3213,7 @@
               <a:rPr lang="en-US" smtClean="0"/>
               <a:t>Click to edit Master title style</a:t>
             </a:r>
-            <a:endParaRPr lang="en-US"/>
+            <a:endParaRPr lang="en-US" dirty="0"/>
           </a:p>
         </p:txBody>
       </p:sp>
@@ -2859,48 +3229,54 @@
         </p:nvSpPr>
         <p:spPr>
           <a:xfrm>
-            <a:off x="1524000" y="3602038"/>
-            <a:ext cx="9144000" cy="1655762"/>
+            <a:off x="1069848" y="4389120"/>
+            <a:ext cx="7891272" cy="1069848"/>
           </a:xfrm>
         </p:spPr>
         <p:txBody>
-          <a:bodyPr/>
+          <a:bodyPr>
+            <a:normAutofit/>
+          </a:bodyPr>
           <a:lstStyle>
-            <a:lvl1pPr marL="0" indent="0" algn="ctr">
+            <a:lvl1pPr marL="0" indent="0" algn="l">
               <a:buNone/>
-              <a:defRPr sz="2400"/>
+              <a:defRPr sz="2200">
+                <a:solidFill>
+                  <a:schemeClr val="tx1"/>
+                </a:solidFill>
+              </a:defRPr>
             </a:lvl1pPr>
             <a:lvl2pPr marL="457200" indent="0" algn="ctr">
               <a:buNone/>
-              <a:defRPr sz="2000"/>
+              <a:defRPr sz="2800"/>
             </a:lvl2pPr>
             <a:lvl3pPr marL="914400" indent="0" algn="ctr">
               <a:buNone/>
-              <a:defRPr sz="1800"/>
+              <a:defRPr sz="2400"/>
             </a:lvl3pPr>
             <a:lvl4pPr marL="1371600" indent="0" algn="ctr">
               <a:buNone/>
-              <a:defRPr sz="1600"/>
+              <a:defRPr sz="2000"/>
             </a:lvl4pPr>
             <a:lvl5pPr marL="1828800" indent="0" algn="ctr">
               <a:buNone/>
-              <a:defRPr sz="1600"/>
+              <a:defRPr sz="2000"/>
             </a:lvl5pPr>
             <a:lvl6pPr marL="2286000" indent="0" algn="ctr">
               <a:buNone/>
-              <a:defRPr sz="1600"/>
+              <a:defRPr sz="2000"/>
             </a:lvl6pPr>
             <a:lvl7pPr marL="2743200" indent="0" algn="ctr">
               <a:buNone/>
-              <a:defRPr sz="1600"/>
+              <a:defRPr sz="2000"/>
             </a:lvl7pPr>
             <a:lvl8pPr marL="3200400" indent="0" algn="ctr">
               <a:buNone/>
-              <a:defRPr sz="1600"/>
+              <a:defRPr sz="2000"/>
             </a:lvl8pPr>
             <a:lvl9pPr marL="3657600" indent="0" algn="ctr">
               <a:buNone/>
-              <a:defRPr sz="1600"/>
+              <a:defRPr sz="2000"/>
             </a:lvl9pPr>
           </a:lstStyle>
           <a:p>
@@ -2908,7 +3284,7 @@
               <a:rPr lang="en-US" smtClean="0"/>
               <a:t>Click to edit Master subtitle style</a:t>
             </a:r>
-            <a:endParaRPr lang="en-US"/>
+            <a:endParaRPr lang="en-US" dirty="0"/>
           </a:p>
         </p:txBody>
       </p:sp>
@@ -2929,7 +3305,7 @@
           <a:p>
             <a:fld id="{119DC1D1-559C-EB4C-A5A4-FAAE1895E276}" type="datetimeFigureOut">
               <a:rPr lang="en-US" smtClean="0"/>
-              <a:t>12/1/16</a:t>
+              <a:t>12/4/16</a:t>
             </a:fld>
             <a:endParaRPr lang="en-US"/>
           </a:p>
@@ -2964,10 +3340,19 @@
             <p:ph type="sldNum" sz="quarter" idx="12"/>
           </p:nvPr>
         </p:nvSpPr>
-        <p:spPr/>
+        <p:spPr>
+          <a:xfrm>
+            <a:off x="9592733" y="4289334"/>
+            <a:ext cx="1193868" cy="640080"/>
+          </a:xfrm>
+        </p:spPr>
         <p:txBody>
           <a:bodyPr/>
-          <a:lstStyle/>
+          <a:lstStyle>
+            <a:lvl1pPr>
+              <a:defRPr sz="2800"/>
+            </a:lvl1pPr>
+          </a:lstStyle>
           <a:p>
             <a:fld id="{DC6561F6-6FD0-224E-A940-C8DB3E1DD017}" type="slidenum">
               <a:rPr lang="en-US" smtClean="0"/>
@@ -2978,11 +3363,7 @@
         </p:txBody>
       </p:sp>
     </p:spTree>
-    <p:extLst>
-      <p:ext uri="{BB962C8B-B14F-4D97-AF65-F5344CB8AC3E}">
-        <p14:creationId xmlns:p14="http://schemas.microsoft.com/office/powerpoint/2010/main" val="784757247"/>
-      </p:ext>
-    </p:extLst>
+    <p:extLst/>
   </p:cSld>
   <p:clrMapOvr>
     <a:masterClrMapping/>
@@ -3099,7 +3480,7 @@
           <a:p>
             <a:fld id="{119DC1D1-559C-EB4C-A5A4-FAAE1895E276}" type="datetimeFigureOut">
               <a:rPr lang="en-US" smtClean="0"/>
-              <a:t>12/1/16</a:t>
+              <a:t>12/4/16</a:t>
             </a:fld>
             <a:endParaRPr lang="en-US"/>
           </a:p>
@@ -3148,11 +3529,7 @@
         </p:txBody>
       </p:sp>
     </p:spTree>
-    <p:extLst>
-      <p:ext uri="{BB962C8B-B14F-4D97-AF65-F5344CB8AC3E}">
-        <p14:creationId xmlns:p14="http://schemas.microsoft.com/office/powerpoint/2010/main" val="733010262"/>
-      </p:ext>
-    </p:extLst>
+    <p:extLst/>
   </p:cSld>
   <p:clrMapOvr>
     <a:masterClrMapping/>
@@ -3189,8 +3566,8 @@
         </p:nvSpPr>
         <p:spPr>
           <a:xfrm>
-            <a:off x="8724900" y="365125"/>
-            <a:ext cx="2628900" cy="5811838"/>
+            <a:off x="8724900" y="533400"/>
+            <a:ext cx="2552700" cy="5638800"/>
           </a:xfrm>
         </p:spPr>
         <p:txBody>
@@ -3201,7 +3578,7 @@
               <a:rPr lang="en-US" smtClean="0"/>
               <a:t>Click to edit Master title style</a:t>
             </a:r>
-            <a:endParaRPr lang="en-US"/>
+            <a:endParaRPr lang="en-US" dirty="0"/>
           </a:p>
         </p:txBody>
       </p:sp>
@@ -3217,8 +3594,8 @@
         </p:nvSpPr>
         <p:spPr>
           <a:xfrm>
-            <a:off x="838200" y="365125"/>
-            <a:ext cx="7734300" cy="5811838"/>
+            <a:off x="1066800" y="533400"/>
+            <a:ext cx="7505700" cy="5638800"/>
           </a:xfrm>
         </p:spPr>
         <p:txBody>
@@ -3258,7 +3635,7 @@
               <a:rPr lang="en-US" smtClean="0"/>
               <a:t>Fifth level</a:t>
             </a:r>
-            <a:endParaRPr lang="en-US"/>
+            <a:endParaRPr lang="en-US" dirty="0"/>
           </a:p>
         </p:txBody>
       </p:sp>
@@ -3279,7 +3656,7 @@
           <a:p>
             <a:fld id="{119DC1D1-559C-EB4C-A5A4-FAAE1895E276}" type="datetimeFigureOut">
               <a:rPr lang="en-US" smtClean="0"/>
-              <a:t>12/1/16</a:t>
+              <a:t>12/4/16</a:t>
             </a:fld>
             <a:endParaRPr lang="en-US"/>
           </a:p>
@@ -3328,11 +3705,7 @@
         </p:txBody>
       </p:sp>
     </p:spTree>
-    <p:extLst>
-      <p:ext uri="{BB962C8B-B14F-4D97-AF65-F5344CB8AC3E}">
-        <p14:creationId xmlns:p14="http://schemas.microsoft.com/office/powerpoint/2010/main" val="1737274242"/>
-      </p:ext>
-    </p:extLst>
+    <p:extLst/>
   </p:cSld>
   <p:clrMapOvr>
     <a:masterClrMapping/>
@@ -3376,7 +3749,7 @@
               <a:rPr lang="en-US" smtClean="0"/>
               <a:t>Click to edit Master title style</a:t>
             </a:r>
-            <a:endParaRPr lang="en-US"/>
+            <a:endParaRPr lang="en-US" dirty="0"/>
           </a:p>
         </p:txBody>
       </p:sp>
@@ -3428,7 +3801,7 @@
               <a:rPr lang="en-US" smtClean="0"/>
               <a:t>Fifth level</a:t>
             </a:r>
-            <a:endParaRPr lang="en-US"/>
+            <a:endParaRPr lang="en-US" dirty="0"/>
           </a:p>
         </p:txBody>
       </p:sp>
@@ -3449,7 +3822,7 @@
           <a:p>
             <a:fld id="{119DC1D1-559C-EB4C-A5A4-FAAE1895E276}" type="datetimeFigureOut">
               <a:rPr lang="en-US" smtClean="0"/>
-              <a:t>12/1/16</a:t>
+              <a:t>12/4/16</a:t>
             </a:fld>
             <a:endParaRPr lang="en-US"/>
           </a:p>
@@ -3498,11 +3871,7 @@
         </p:txBody>
       </p:sp>
     </p:spTree>
-    <p:extLst>
-      <p:ext uri="{BB962C8B-B14F-4D97-AF65-F5344CB8AC3E}">
-        <p14:creationId xmlns:p14="http://schemas.microsoft.com/office/powerpoint/2010/main" val="1717974102"/>
-      </p:ext>
-    </p:extLst>
+    <p:extLst/>
   </p:cSld>
   <p:clrMapOvr>
     <a:masterClrMapping/>
@@ -3511,7 +3880,7 @@
 </file>
 
 <file path=ppt/slideLayouts/slideLayout3.xml><?xml version="1.0" encoding="utf-8"?>
-<p:sldLayout xmlns:a="http://schemas.openxmlformats.org/drawingml/2006/main" xmlns:r="http://schemas.openxmlformats.org/officeDocument/2006/relationships" xmlns:p="http://schemas.openxmlformats.org/presentationml/2006/main" type="secHead" preserve="1">
+<p:sldLayout xmlns:a="http://schemas.openxmlformats.org/drawingml/2006/main" xmlns:r="http://schemas.openxmlformats.org/officeDocument/2006/relationships" xmlns:p="http://schemas.openxmlformats.org/presentationml/2006/main" showMasterSp="0" type="secHead" preserve="1">
   <p:cSld name="Section Header">
     <p:spTree>
       <p:nvGrpSpPr>
@@ -3529,6 +3898,71 @@
       </p:grpSpPr>
       <p:sp>
         <p:nvSpPr>
+          <p:cNvPr id="7" name="Rectangle 6"/>
+          <p:cNvSpPr/>
+          <p:nvPr/>
+        </p:nvSpPr>
+        <p:spPr>
+          <a:xfrm>
+            <a:off x="0" y="4917989"/>
+            <a:ext cx="12192000" cy="1940010"/>
+          </a:xfrm>
+          <a:prstGeom prst="rect">
+            <a:avLst/>
+          </a:prstGeom>
+          <a:blipFill dpi="0" rotWithShape="1">
+            <a:blip r:embed="rId2">
+              <a:alphaModFix amt="85000"/>
+              <a:lum bright="70000" contrast="-70000"/>
+              <a:extLst>
+                <a:ext uri="{BEBA8EAE-BF5A-486C-A8C5-ECC9F3942E4B}">
+                  <a14:imgProps xmlns:a14="http://schemas.microsoft.com/office/drawing/2010/main">
+                    <a14:imgLayer r:embed="rId3">
+                      <a14:imgEffect>
+                        <a14:sharpenSoften amount="61000"/>
+                      </a14:imgEffect>
+                    </a14:imgLayer>
+                  </a14:imgProps>
+                </a:ext>
+                <a:ext uri="{28A0092B-C50C-407E-A947-70E740481C1C}">
+                  <a14:useLocalDpi xmlns:a14="http://schemas.microsoft.com/office/drawing/2010/main" val="0"/>
+                </a:ext>
+              </a:extLst>
+            </a:blip>
+            <a:srcRect/>
+            <a:tile tx="0" ty="-704850" sx="92000" sy="89000" flip="xy" algn="ctr"/>
+          </a:blipFill>
+          <a:ln>
+            <a:noFill/>
+          </a:ln>
+        </p:spPr>
+        <p:style>
+          <a:lnRef idx="2">
+            <a:schemeClr val="accent1">
+              <a:shade val="50000"/>
+            </a:schemeClr>
+          </a:lnRef>
+          <a:fillRef idx="1">
+            <a:schemeClr val="accent1"/>
+          </a:fillRef>
+          <a:effectRef idx="0">
+            <a:schemeClr val="accent1"/>
+          </a:effectRef>
+          <a:fontRef idx="minor">
+            <a:schemeClr val="lt1"/>
+          </a:fontRef>
+        </p:style>
+        <p:txBody>
+          <a:bodyPr rtlCol="0" anchor="ctr"/>
+          <a:lstStyle/>
+          <a:p>
+            <a:pPr algn="ctr"/>
+            <a:endParaRPr lang="en-US"/>
+          </a:p>
+        </p:txBody>
+      </p:sp>
+      <p:sp>
+        <p:nvSpPr>
           <p:cNvPr id="2" name="Title 1"/>
           <p:cNvSpPr>
             <a:spLocks noGrp="1"/>
@@ -3539,15 +3973,20 @@
         </p:nvSpPr>
         <p:spPr>
           <a:xfrm>
-            <a:off x="831850" y="1709738"/>
-            <a:ext cx="10515600" cy="2852737"/>
+            <a:off x="2167128" y="1225296"/>
+            <a:ext cx="9281160" cy="3520440"/>
           </a:xfrm>
         </p:spPr>
         <p:txBody>
-          <a:bodyPr anchor="b"/>
+          <a:bodyPr anchor="ctr">
+            <a:normAutofit/>
+          </a:bodyPr>
           <a:lstStyle>
             <a:lvl1pPr>
-              <a:defRPr sz="6000"/>
+              <a:lnSpc>
+                <a:spcPct val="80000"/>
+              </a:lnSpc>
+              <a:defRPr sz="8000" b="0"/>
             </a:lvl1pPr>
           </a:lstStyle>
           <a:p>
@@ -3555,7 +3994,7 @@
               <a:rPr lang="en-US" smtClean="0"/>
               <a:t>Click to edit Master title style</a:t>
             </a:r>
-            <a:endParaRPr lang="en-US"/>
+            <a:endParaRPr lang="en-US" dirty="0"/>
           </a:p>
         </p:txBody>
       </p:sp>
@@ -3571,26 +4010,26 @@
         </p:nvSpPr>
         <p:spPr>
           <a:xfrm>
-            <a:off x="831850" y="4589463"/>
-            <a:ext cx="10515600" cy="1500187"/>
+            <a:off x="2165774" y="5020056"/>
+            <a:ext cx="9052560" cy="1066800"/>
           </a:xfrm>
         </p:spPr>
         <p:txBody>
-          <a:bodyPr/>
+          <a:bodyPr anchor="t">
+            <a:normAutofit/>
+          </a:bodyPr>
           <a:lstStyle>
             <a:lvl1pPr marL="0" indent="0">
               <a:buNone/>
-              <a:defRPr sz="2400">
+              <a:defRPr sz="2000">
                 <a:solidFill>
-                  <a:schemeClr val="tx1">
-                    <a:tint val="75000"/>
-                  </a:schemeClr>
+                  <a:schemeClr val="tx1"/>
                 </a:solidFill>
               </a:defRPr>
             </a:lvl1pPr>
             <a:lvl2pPr marL="457200" indent="0">
               <a:buNone/>
-              <a:defRPr sz="2000">
+              <a:defRPr sz="1800">
                 <a:solidFill>
                   <a:schemeClr val="tx1">
                     <a:tint val="75000"/>
@@ -3600,7 +4039,7 @@
             </a:lvl2pPr>
             <a:lvl3pPr marL="914400" indent="0">
               <a:buNone/>
-              <a:defRPr sz="1800">
+              <a:defRPr sz="1600">
                 <a:solidFill>
                   <a:schemeClr val="tx1">
                     <a:tint val="75000"/>
@@ -3610,7 +4049,7 @@
             </a:lvl3pPr>
             <a:lvl4pPr marL="1371600" indent="0">
               <a:buNone/>
-              <a:defRPr sz="1600">
+              <a:defRPr sz="1400">
                 <a:solidFill>
                   <a:schemeClr val="tx1">
                     <a:tint val="75000"/>
@@ -3620,7 +4059,7 @@
             </a:lvl4pPr>
             <a:lvl5pPr marL="1828800" indent="0">
               <a:buNone/>
-              <a:defRPr sz="1600">
+              <a:defRPr sz="1400">
                 <a:solidFill>
                   <a:schemeClr val="tx1">
                     <a:tint val="75000"/>
@@ -3630,7 +4069,7 @@
             </a:lvl5pPr>
             <a:lvl6pPr marL="2286000" indent="0">
               <a:buNone/>
-              <a:defRPr sz="1600">
+              <a:defRPr sz="1400">
                 <a:solidFill>
                   <a:schemeClr val="tx1">
                     <a:tint val="75000"/>
@@ -3640,7 +4079,7 @@
             </a:lvl6pPr>
             <a:lvl7pPr marL="2743200" indent="0">
               <a:buNone/>
-              <a:defRPr sz="1600">
+              <a:defRPr sz="1400">
                 <a:solidFill>
                   <a:schemeClr val="tx1">
                     <a:tint val="75000"/>
@@ -3650,7 +4089,7 @@
             </a:lvl7pPr>
             <a:lvl8pPr marL="3200400" indent="0">
               <a:buNone/>
-              <a:defRPr sz="1600">
+              <a:defRPr sz="1400">
                 <a:solidFill>
                   <a:schemeClr val="tx1">
                     <a:tint val="75000"/>
@@ -3660,7 +4099,7 @@
             </a:lvl8pPr>
             <a:lvl9pPr marL="3657600" indent="0">
               <a:buNone/>
-              <a:defRPr sz="1600">
+              <a:defRPr sz="1400">
                 <a:solidFill>
                   <a:schemeClr val="tx1">
                     <a:tint val="75000"/>
@@ -3688,14 +4127,19 @@
             <p:ph type="dt" sz="half" idx="10"/>
           </p:nvPr>
         </p:nvSpPr>
-        <p:spPr/>
+        <p:spPr>
+          <a:xfrm>
+            <a:off x="8593667" y="6272784"/>
+            <a:ext cx="2644309" cy="365125"/>
+          </a:xfrm>
+        </p:spPr>
         <p:txBody>
           <a:bodyPr/>
           <a:lstStyle/>
           <a:p>
             <a:fld id="{119DC1D1-559C-EB4C-A5A4-FAAE1895E276}" type="datetimeFigureOut">
               <a:rPr lang="en-US" smtClean="0"/>
-              <a:t>12/1/16</a:t>
+              <a:t>12/4/16</a:t>
             </a:fld>
             <a:endParaRPr lang="en-US"/>
           </a:p>
@@ -3711,7 +4155,12 @@
             <p:ph type="ftr" sz="quarter" idx="11"/>
           </p:nvPr>
         </p:nvSpPr>
-        <p:spPr/>
+        <p:spPr>
+          <a:xfrm>
+            <a:off x="2182708" y="6272784"/>
+            <a:ext cx="6327648" cy="365125"/>
+          </a:xfrm>
+        </p:spPr>
         <p:txBody>
           <a:bodyPr/>
           <a:lstStyle/>
@@ -3720,6 +4169,164 @@
           </a:p>
         </p:txBody>
       </p:sp>
+      <p:grpSp>
+        <p:nvGrpSpPr>
+          <p:cNvPr id="8" name="Group 7"/>
+          <p:cNvGrpSpPr/>
+          <p:nvPr/>
+        </p:nvGrpSpPr>
+        <p:grpSpPr>
+          <a:xfrm>
+            <a:off x="897399" y="2325848"/>
+            <a:ext cx="1080904" cy="1080902"/>
+            <a:chOff x="9685338" y="4460675"/>
+            <a:chExt cx="1080904" cy="1080902"/>
+          </a:xfrm>
+        </p:grpSpPr>
+        <p:sp>
+          <p:nvSpPr>
+            <p:cNvPr id="9" name="Oval 8"/>
+            <p:cNvSpPr/>
+            <p:nvPr/>
+          </p:nvSpPr>
+          <p:spPr>
+            <a:xfrm>
+              <a:off x="9685338" y="4460675"/>
+              <a:ext cx="1080904" cy="1080902"/>
+            </a:xfrm>
+            <a:prstGeom prst="ellipse">
+              <a:avLst/>
+            </a:prstGeom>
+            <a:blipFill dpi="0" rotWithShape="1">
+              <a:blip r:embed="rId4">
+                <a:duotone>
+                  <a:schemeClr val="accent1">
+                    <a:shade val="45000"/>
+                    <a:satMod val="135000"/>
+                  </a:schemeClr>
+                  <a:prstClr val="white"/>
+                </a:duotone>
+                <a:extLst>
+                  <a:ext uri="{BEBA8EAE-BF5A-486C-A8C5-ECC9F3942E4B}">
+                    <a14:imgProps xmlns:a14="http://schemas.microsoft.com/office/drawing/2010/main">
+                      <a14:imgLayer r:embed="rId5">
+                        <a14:imgEffect>
+                          <a14:saturation sat="95000"/>
+                        </a14:imgEffect>
+                      </a14:imgLayer>
+                    </a14:imgProps>
+                  </a:ext>
+                </a:extLst>
+              </a:blip>
+              <a:srcRect/>
+              <a:tile tx="0" ty="0" sx="85000" sy="85000" flip="none" algn="tl"/>
+            </a:blipFill>
+            <a:ln w="25400" cap="flat" cmpd="sng" algn="ctr">
+              <a:noFill/>
+              <a:prstDash val="solid"/>
+            </a:ln>
+            <a:effectLst/>
+          </p:spPr>
+          <p:txBody>
+            <a:bodyPr lIns="0" tIns="0" rIns="0" bIns="0" rtlCol="0" anchor="ctr"/>
+            <a:lstStyle/>
+            <a:p>
+              <a:pPr marL="0" marR="0" lvl="0" indent="0" algn="ctr" defTabSz="914400" eaLnBrk="1" fontAlgn="auto" latinLnBrk="0" hangingPunct="1">
+                <a:lnSpc>
+                  <a:spcPct val="100000"/>
+                </a:lnSpc>
+                <a:spcBef>
+                  <a:spcPts val="0"/>
+                </a:spcBef>
+                <a:spcAft>
+                  <a:spcPts val="0"/>
+                </a:spcAft>
+                <a:buClrTx/>
+                <a:buSzTx/>
+                <a:buFontTx/>
+                <a:buNone/>
+                <a:tabLst/>
+                <a:defRPr/>
+              </a:pPr>
+              <a:endParaRPr kumimoji="0" lang="en-US" sz="2000" b="0" i="0" u="none" strike="noStrike" kern="0" cap="none" spc="0" normalizeH="0" baseline="0" noProof="0" dirty="0">
+                <a:ln>
+                  <a:noFill/>
+                </a:ln>
+                <a:solidFill>
+                  <a:prstClr val="white"/>
+                </a:solidFill>
+                <a:effectLst/>
+                <a:uLnTx/>
+                <a:uFillTx/>
+                <a:latin typeface="Rockwell Extra Bold" pitchFamily="18" charset="0"/>
+                <a:ea typeface="+mn-ea"/>
+                <a:cs typeface="+mn-cs"/>
+              </a:endParaRPr>
+            </a:p>
+          </p:txBody>
+        </p:sp>
+        <p:sp>
+          <p:nvSpPr>
+            <p:cNvPr id="10" name="Oval 9"/>
+            <p:cNvSpPr/>
+            <p:nvPr/>
+          </p:nvSpPr>
+          <p:spPr>
+            <a:xfrm>
+              <a:off x="9793429" y="4568765"/>
+              <a:ext cx="864723" cy="864722"/>
+            </a:xfrm>
+            <a:prstGeom prst="ellipse">
+              <a:avLst/>
+            </a:prstGeom>
+            <a:noFill/>
+            <a:ln w="25400" cap="flat" cmpd="sng" algn="ctr">
+              <a:solidFill>
+                <a:sysClr val="window" lastClr="FFFFFF"/>
+              </a:solidFill>
+              <a:prstDash val="solid"/>
+            </a:ln>
+            <a:effectLst/>
+          </p:spPr>
+          <p:txBody>
+            <a:bodyPr rtlCol="0" anchor="ctr"/>
+            <a:lstStyle/>
+            <a:p>
+              <a:pPr marL="0" marR="0" lvl="0" indent="0" algn="ctr" defTabSz="914400" eaLnBrk="1" fontAlgn="auto" latinLnBrk="0" hangingPunct="1">
+                <a:lnSpc>
+                  <a:spcPct val="100000"/>
+                </a:lnSpc>
+                <a:spcBef>
+                  <a:spcPts val="0"/>
+                </a:spcBef>
+                <a:spcAft>
+                  <a:spcPts val="0"/>
+                </a:spcAft>
+                <a:buClrTx/>
+                <a:buSzTx/>
+                <a:buFontTx/>
+                <a:buNone/>
+                <a:tabLst/>
+                <a:defRPr/>
+              </a:pPr>
+              <a:endParaRPr kumimoji="0" lang="en-US" sz="1800" b="0" i="0" u="none" strike="noStrike" kern="0" cap="none" spc="0" normalizeH="0" baseline="0" noProof="0" dirty="0">
+                <a:ln>
+                  <a:noFill/>
+                </a:ln>
+                <a:solidFill>
+                  <a:prstClr val="white"/>
+                </a:solidFill>
+                <a:effectLst/>
+                <a:uLnTx/>
+                <a:uFillTx/>
+                <a:latin typeface="Calibri"/>
+                <a:ea typeface="+mn-ea"/>
+                <a:cs typeface="+mn-cs"/>
+              </a:endParaRPr>
+            </a:p>
+          </p:txBody>
+        </p:sp>
+      </p:grpSp>
       <p:sp>
         <p:nvSpPr>
           <p:cNvPr id="6" name="Slide Number Placeholder 5"/>
@@ -3730,10 +4337,19 @@
             <p:ph type="sldNum" sz="quarter" idx="12"/>
           </p:nvPr>
         </p:nvSpPr>
-        <p:spPr/>
+        <p:spPr>
+          <a:xfrm>
+            <a:off x="843702" y="2506133"/>
+            <a:ext cx="1188298" cy="720332"/>
+          </a:xfrm>
+        </p:spPr>
         <p:txBody>
           <a:bodyPr/>
-          <a:lstStyle/>
+          <a:lstStyle>
+            <a:lvl1pPr>
+              <a:defRPr sz="2800"/>
+            </a:lvl1pPr>
+          </a:lstStyle>
           <a:p>
             <a:fld id="{DC6561F6-6FD0-224E-A940-C8DB3E1DD017}" type="slidenum">
               <a:rPr lang="en-US" smtClean="0"/>
@@ -3744,11 +4360,7 @@
         </p:txBody>
       </p:sp>
     </p:spTree>
-    <p:extLst>
-      <p:ext uri="{BB962C8B-B14F-4D97-AF65-F5344CB8AC3E}">
-        <p14:creationId xmlns:p14="http://schemas.microsoft.com/office/powerpoint/2010/main" val="1073098399"/>
-      </p:ext>
-    </p:extLst>
+    <p:extLst/>
   </p:cSld>
   <p:clrMapOvr>
     <a:masterClrMapping/>
@@ -3792,7 +4404,7 @@
               <a:rPr lang="en-US" smtClean="0"/>
               <a:t>Click to edit Master title style</a:t>
             </a:r>
-            <a:endParaRPr lang="en-US"/>
+            <a:endParaRPr lang="en-US" dirty="0"/>
           </a:p>
         </p:txBody>
       </p:sp>
@@ -3808,13 +4420,41 @@
         </p:nvSpPr>
         <p:spPr>
           <a:xfrm>
-            <a:off x="838200" y="1825625"/>
-            <a:ext cx="5181600" cy="4351338"/>
+            <a:off x="1069848" y="2194560"/>
+            <a:ext cx="4754880" cy="3977640"/>
           </a:xfrm>
         </p:spPr>
         <p:txBody>
           <a:bodyPr/>
-          <a:lstStyle/>
+          <a:lstStyle>
+            <a:lvl1pPr>
+              <a:defRPr sz="2000"/>
+            </a:lvl1pPr>
+            <a:lvl2pPr>
+              <a:defRPr sz="1800"/>
+            </a:lvl2pPr>
+            <a:lvl3pPr>
+              <a:defRPr sz="1600"/>
+            </a:lvl3pPr>
+            <a:lvl4pPr>
+              <a:defRPr sz="1600"/>
+            </a:lvl4pPr>
+            <a:lvl5pPr>
+              <a:defRPr sz="1600"/>
+            </a:lvl5pPr>
+            <a:lvl6pPr>
+              <a:defRPr sz="1800"/>
+            </a:lvl6pPr>
+            <a:lvl7pPr>
+              <a:defRPr sz="1800"/>
+            </a:lvl7pPr>
+            <a:lvl8pPr>
+              <a:defRPr sz="1800"/>
+            </a:lvl8pPr>
+            <a:lvl9pPr>
+              <a:defRPr sz="1800"/>
+            </a:lvl9pPr>
+          </a:lstStyle>
           <a:p>
             <a:pPr lvl="0"/>
             <a:r>
@@ -3849,7 +4489,7 @@
               <a:rPr lang="en-US" smtClean="0"/>
               <a:t>Fifth level</a:t>
             </a:r>
-            <a:endParaRPr lang="en-US"/>
+            <a:endParaRPr lang="en-US" dirty="0"/>
           </a:p>
         </p:txBody>
       </p:sp>
@@ -3865,13 +4505,41 @@
         </p:nvSpPr>
         <p:spPr>
           <a:xfrm>
-            <a:off x="6172200" y="1825625"/>
-            <a:ext cx="5181600" cy="4351338"/>
+            <a:off x="6364224" y="2194560"/>
+            <a:ext cx="4754880" cy="3977640"/>
           </a:xfrm>
         </p:spPr>
         <p:txBody>
           <a:bodyPr/>
-          <a:lstStyle/>
+          <a:lstStyle>
+            <a:lvl1pPr>
+              <a:defRPr sz="2000"/>
+            </a:lvl1pPr>
+            <a:lvl2pPr>
+              <a:defRPr sz="1800"/>
+            </a:lvl2pPr>
+            <a:lvl3pPr>
+              <a:defRPr sz="1600"/>
+            </a:lvl3pPr>
+            <a:lvl4pPr>
+              <a:defRPr sz="1600"/>
+            </a:lvl4pPr>
+            <a:lvl5pPr>
+              <a:defRPr sz="1600"/>
+            </a:lvl5pPr>
+            <a:lvl6pPr>
+              <a:defRPr sz="1800"/>
+            </a:lvl6pPr>
+            <a:lvl7pPr>
+              <a:defRPr sz="1800"/>
+            </a:lvl7pPr>
+            <a:lvl8pPr>
+              <a:defRPr sz="1800"/>
+            </a:lvl8pPr>
+            <a:lvl9pPr>
+              <a:defRPr sz="1800"/>
+            </a:lvl9pPr>
+          </a:lstStyle>
           <a:p>
             <a:pPr lvl="0"/>
             <a:r>
@@ -3906,7 +4574,7 @@
               <a:rPr lang="en-US" smtClean="0"/>
               <a:t>Fifth level</a:t>
             </a:r>
-            <a:endParaRPr lang="en-US"/>
+            <a:endParaRPr lang="en-US" dirty="0"/>
           </a:p>
         </p:txBody>
       </p:sp>
@@ -3927,7 +4595,7 @@
           <a:p>
             <a:fld id="{119DC1D1-559C-EB4C-A5A4-FAAE1895E276}" type="datetimeFigureOut">
               <a:rPr lang="en-US" smtClean="0"/>
-              <a:t>12/1/16</a:t>
+              <a:t>12/4/16</a:t>
             </a:fld>
             <a:endParaRPr lang="en-US"/>
           </a:p>
@@ -3976,11 +4644,7 @@
         </p:txBody>
       </p:sp>
     </p:spTree>
-    <p:extLst>
-      <p:ext uri="{BB962C8B-B14F-4D97-AF65-F5344CB8AC3E}">
-        <p14:creationId xmlns:p14="http://schemas.microsoft.com/office/powerpoint/2010/main" val="997124487"/>
-      </p:ext>
-    </p:extLst>
+    <p:extLst/>
   </p:cSld>
   <p:clrMapOvr>
     <a:masterClrMapping/>
@@ -3989,7 +4653,7 @@
 </file>
 
 <file path=ppt/slideLayouts/slideLayout5.xml><?xml version="1.0" encoding="utf-8"?>
-<p:sldLayout xmlns:a="http://schemas.openxmlformats.org/drawingml/2006/main" xmlns:r="http://schemas.openxmlformats.org/officeDocument/2006/relationships" xmlns:p="http://schemas.openxmlformats.org/presentationml/2006/main" type="twoTxTwoObj" preserve="1">
+<p:sldLayout xmlns:a="http://schemas.openxmlformats.org/drawingml/2006/main" xmlns:r="http://schemas.openxmlformats.org/officeDocument/2006/relationships" xmlns:p="http://schemas.openxmlformats.org/presentationml/2006/main" preserve="1">
   <p:cSld name="Comparison">
     <p:spTree>
       <p:nvGrpSpPr>
@@ -4007,34 +4671,6 @@
       </p:grpSpPr>
       <p:sp>
         <p:nvSpPr>
-          <p:cNvPr id="2" name="Title 1"/>
-          <p:cNvSpPr>
-            <a:spLocks noGrp="1"/>
-          </p:cNvSpPr>
-          <p:nvPr>
-            <p:ph type="title"/>
-          </p:nvPr>
-        </p:nvSpPr>
-        <p:spPr>
-          <a:xfrm>
-            <a:off x="839788" y="365125"/>
-            <a:ext cx="10515600" cy="1325563"/>
-          </a:xfrm>
-        </p:spPr>
-        <p:txBody>
-          <a:bodyPr/>
-          <a:lstStyle/>
-          <a:p>
-            <a:r>
-              <a:rPr lang="en-US" smtClean="0"/>
-              <a:t>Click to edit Master title style</a:t>
-            </a:r>
-            <a:endParaRPr lang="en-US"/>
-          </a:p>
-        </p:txBody>
-      </p:sp>
-      <p:sp>
-        <p:nvSpPr>
           <p:cNvPr id="3" name="Text Placeholder 2"/>
           <p:cNvSpPr>
             <a:spLocks noGrp="1"/>
@@ -4045,16 +4681,24 @@
         </p:nvSpPr>
         <p:spPr>
           <a:xfrm>
-            <a:off x="839788" y="1681163"/>
-            <a:ext cx="5157787" cy="823912"/>
+            <a:off x="1066800" y="2048256"/>
+            <a:ext cx="4754880" cy="640080"/>
           </a:xfrm>
         </p:spPr>
         <p:txBody>
-          <a:bodyPr anchor="b"/>
+          <a:bodyPr anchor="ctr">
+            <a:normAutofit/>
+          </a:bodyPr>
           <a:lstStyle>
             <a:lvl1pPr marL="0" indent="0">
               <a:buNone/>
-              <a:defRPr sz="2400" b="1"/>
+              <a:defRPr sz="2000" b="1">
+                <a:solidFill>
+                  <a:schemeClr val="accent1">
+                    <a:lumMod val="75000"/>
+                  </a:schemeClr>
+                </a:solidFill>
+              </a:defRPr>
             </a:lvl1pPr>
             <a:lvl2pPr marL="457200" indent="0">
               <a:buNone/>
@@ -4110,13 +4754,41 @@
         </p:nvSpPr>
         <p:spPr>
           <a:xfrm>
-            <a:off x="839788" y="2505075"/>
-            <a:ext cx="5157787" cy="3684588"/>
+            <a:off x="1069848" y="2743200"/>
+            <a:ext cx="4754880" cy="3291840"/>
           </a:xfrm>
         </p:spPr>
         <p:txBody>
           <a:bodyPr/>
-          <a:lstStyle/>
+          <a:lstStyle>
+            <a:lvl1pPr>
+              <a:defRPr sz="2000"/>
+            </a:lvl1pPr>
+            <a:lvl2pPr>
+              <a:defRPr sz="1800"/>
+            </a:lvl2pPr>
+            <a:lvl3pPr>
+              <a:defRPr sz="1600"/>
+            </a:lvl3pPr>
+            <a:lvl4pPr>
+              <a:defRPr sz="1600"/>
+            </a:lvl4pPr>
+            <a:lvl5pPr>
+              <a:defRPr sz="1600"/>
+            </a:lvl5pPr>
+            <a:lvl6pPr>
+              <a:defRPr sz="1600"/>
+            </a:lvl6pPr>
+            <a:lvl7pPr>
+              <a:defRPr sz="1600"/>
+            </a:lvl7pPr>
+            <a:lvl8pPr>
+              <a:defRPr sz="1600"/>
+            </a:lvl8pPr>
+            <a:lvl9pPr>
+              <a:defRPr sz="1600"/>
+            </a:lvl9pPr>
+          </a:lstStyle>
           <a:p>
             <a:pPr lvl="0"/>
             <a:r>
@@ -4151,7 +4823,7 @@
               <a:rPr lang="en-US" smtClean="0"/>
               <a:t>Fifth level</a:t>
             </a:r>
-            <a:endParaRPr lang="en-US"/>
+            <a:endParaRPr lang="en-US" dirty="0"/>
           </a:p>
         </p:txBody>
       </p:sp>
@@ -4167,16 +4839,24 @@
         </p:nvSpPr>
         <p:spPr>
           <a:xfrm>
-            <a:off x="6172200" y="1681163"/>
-            <a:ext cx="5183188" cy="823912"/>
+            <a:off x="6364224" y="2048256"/>
+            <a:ext cx="4754880" cy="640080"/>
           </a:xfrm>
         </p:spPr>
         <p:txBody>
-          <a:bodyPr anchor="b"/>
+          <a:bodyPr anchor="ctr">
+            <a:normAutofit/>
+          </a:bodyPr>
           <a:lstStyle>
             <a:lvl1pPr marL="0" indent="0">
               <a:buNone/>
-              <a:defRPr sz="2400" b="1"/>
+              <a:defRPr sz="2000" b="1">
+                <a:solidFill>
+                  <a:schemeClr val="accent1">
+                    <a:lumMod val="75000"/>
+                  </a:schemeClr>
+                </a:solidFill>
+              </a:defRPr>
             </a:lvl1pPr>
             <a:lvl2pPr marL="457200" indent="0">
               <a:buNone/>
@@ -4232,13 +4912,41 @@
         </p:nvSpPr>
         <p:spPr>
           <a:xfrm>
-            <a:off x="6172200" y="2505075"/>
-            <a:ext cx="5183188" cy="3684588"/>
+            <a:off x="6364224" y="2743200"/>
+            <a:ext cx="4754880" cy="3291840"/>
           </a:xfrm>
         </p:spPr>
         <p:txBody>
           <a:bodyPr/>
-          <a:lstStyle/>
+          <a:lstStyle>
+            <a:lvl1pPr>
+              <a:defRPr sz="2000"/>
+            </a:lvl1pPr>
+            <a:lvl2pPr>
+              <a:defRPr sz="1800"/>
+            </a:lvl2pPr>
+            <a:lvl3pPr>
+              <a:defRPr sz="1600"/>
+            </a:lvl3pPr>
+            <a:lvl4pPr>
+              <a:defRPr sz="1600"/>
+            </a:lvl4pPr>
+            <a:lvl5pPr>
+              <a:defRPr sz="1600"/>
+            </a:lvl5pPr>
+            <a:lvl6pPr>
+              <a:defRPr sz="1600"/>
+            </a:lvl6pPr>
+            <a:lvl7pPr>
+              <a:defRPr sz="1600"/>
+            </a:lvl7pPr>
+            <a:lvl8pPr>
+              <a:defRPr sz="1600"/>
+            </a:lvl8pPr>
+            <a:lvl9pPr>
+              <a:defRPr sz="1600"/>
+            </a:lvl9pPr>
+          </a:lstStyle>
           <a:p>
             <a:pPr lvl="0"/>
             <a:r>
@@ -4273,7 +4981,7 @@
               <a:rPr lang="en-US" smtClean="0"/>
               <a:t>Fifth level</a:t>
             </a:r>
-            <a:endParaRPr lang="en-US"/>
+            <a:endParaRPr lang="en-US" dirty="0"/>
           </a:p>
         </p:txBody>
       </p:sp>
@@ -4294,7 +5002,7 @@
           <a:p>
             <a:fld id="{119DC1D1-559C-EB4C-A5A4-FAAE1895E276}" type="datetimeFigureOut">
               <a:rPr lang="en-US" smtClean="0"/>
-              <a:t>12/1/16</a:t>
+              <a:t>12/4/16</a:t>
             </a:fld>
             <a:endParaRPr lang="en-US"/>
           </a:p>
@@ -4342,12 +5050,31 @@
           </a:p>
         </p:txBody>
       </p:sp>
+      <p:sp>
+        <p:nvSpPr>
+          <p:cNvPr id="10" name="Title 9"/>
+          <p:cNvSpPr>
+            <a:spLocks noGrp="1"/>
+          </p:cNvSpPr>
+          <p:nvPr>
+            <p:ph type="title"/>
+          </p:nvPr>
+        </p:nvSpPr>
+        <p:spPr/>
+        <p:txBody>
+          <a:bodyPr/>
+          <a:lstStyle/>
+          <a:p>
+            <a:r>
+              <a:rPr lang="en-US" smtClean="0"/>
+              <a:t>Click to edit Master title style</a:t>
+            </a:r>
+            <a:endParaRPr lang="en-US" dirty="0"/>
+          </a:p>
+        </p:txBody>
+      </p:sp>
     </p:spTree>
-    <p:extLst>
-      <p:ext uri="{BB962C8B-B14F-4D97-AF65-F5344CB8AC3E}">
-        <p14:creationId xmlns:p14="http://schemas.microsoft.com/office/powerpoint/2010/main" val="1856355468"/>
-      </p:ext>
-    </p:extLst>
+    <p:extLst/>
   </p:cSld>
   <p:clrMapOvr>
     <a:masterClrMapping/>
@@ -4356,7 +5083,7 @@
 </file>
 
 <file path=ppt/slideLayouts/slideLayout6.xml><?xml version="1.0" encoding="utf-8"?>
-<p:sldLayout xmlns:a="http://schemas.openxmlformats.org/drawingml/2006/main" xmlns:r="http://schemas.openxmlformats.org/officeDocument/2006/relationships" xmlns:p="http://schemas.openxmlformats.org/presentationml/2006/main" type="titleOnly" preserve="1">
+<p:sldLayout xmlns:a="http://schemas.openxmlformats.org/drawingml/2006/main" xmlns:r="http://schemas.openxmlformats.org/officeDocument/2006/relationships" xmlns:p="http://schemas.openxmlformats.org/presentationml/2006/main" preserve="1">
   <p:cSld name="Title Only">
     <p:spTree>
       <p:nvGrpSpPr>
@@ -4374,29 +5101,6 @@
       </p:grpSpPr>
       <p:sp>
         <p:nvSpPr>
-          <p:cNvPr id="2" name="Title 1"/>
-          <p:cNvSpPr>
-            <a:spLocks noGrp="1"/>
-          </p:cNvSpPr>
-          <p:nvPr>
-            <p:ph type="title"/>
-          </p:nvPr>
-        </p:nvSpPr>
-        <p:spPr/>
-        <p:txBody>
-          <a:bodyPr/>
-          <a:lstStyle/>
-          <a:p>
-            <a:r>
-              <a:rPr lang="en-US" smtClean="0"/>
-              <a:t>Click to edit Master title style</a:t>
-            </a:r>
-            <a:endParaRPr lang="en-US"/>
-          </a:p>
-        </p:txBody>
-      </p:sp>
-      <p:sp>
-        <p:nvSpPr>
           <p:cNvPr id="3" name="Date Placeholder 2"/>
           <p:cNvSpPr>
             <a:spLocks noGrp="1"/>
@@ -4412,7 +5116,7 @@
           <a:p>
             <a:fld id="{119DC1D1-559C-EB4C-A5A4-FAAE1895E276}" type="datetimeFigureOut">
               <a:rPr lang="en-US" smtClean="0"/>
-              <a:t>12/1/16</a:t>
+              <a:t>12/4/16</a:t>
             </a:fld>
             <a:endParaRPr lang="en-US"/>
           </a:p>
@@ -4460,12 +5164,31 @@
           </a:p>
         </p:txBody>
       </p:sp>
+      <p:sp>
+        <p:nvSpPr>
+          <p:cNvPr id="6" name="Title 5"/>
+          <p:cNvSpPr>
+            <a:spLocks noGrp="1"/>
+          </p:cNvSpPr>
+          <p:nvPr>
+            <p:ph type="title"/>
+          </p:nvPr>
+        </p:nvSpPr>
+        <p:spPr/>
+        <p:txBody>
+          <a:bodyPr/>
+          <a:lstStyle/>
+          <a:p>
+            <a:r>
+              <a:rPr lang="en-US" smtClean="0"/>
+              <a:t>Click to edit Master title style</a:t>
+            </a:r>
+            <a:endParaRPr lang="en-US"/>
+          </a:p>
+        </p:txBody>
+      </p:sp>
     </p:spTree>
-    <p:extLst>
-      <p:ext uri="{BB962C8B-B14F-4D97-AF65-F5344CB8AC3E}">
-        <p14:creationId xmlns:p14="http://schemas.microsoft.com/office/powerpoint/2010/main" val="1123927060"/>
-      </p:ext>
-    </p:extLst>
+    <p:extLst/>
   </p:cSld>
   <p:clrMapOvr>
     <a:masterClrMapping/>
@@ -4507,7 +5230,7 @@
           <a:p>
             <a:fld id="{119DC1D1-559C-EB4C-A5A4-FAAE1895E276}" type="datetimeFigureOut">
               <a:rPr lang="en-US" smtClean="0"/>
-              <a:t>12/1/16</a:t>
+              <a:t>12/4/16</a:t>
             </a:fld>
             <a:endParaRPr lang="en-US"/>
           </a:p>
@@ -4556,11 +5279,7 @@
         </p:txBody>
       </p:sp>
     </p:spTree>
-    <p:extLst>
-      <p:ext uri="{BB962C8B-B14F-4D97-AF65-F5344CB8AC3E}">
-        <p14:creationId xmlns:p14="http://schemas.microsoft.com/office/powerpoint/2010/main" val="575938408"/>
-      </p:ext>
-    </p:extLst>
+    <p:extLst/>
   </p:cSld>
   <p:clrMapOvr>
     <a:masterClrMapping/>
@@ -4569,7 +5288,7 @@
 </file>
 
 <file path=ppt/slideLayouts/slideLayout8.xml><?xml version="1.0" encoding="utf-8"?>
-<p:sldLayout xmlns:a="http://schemas.openxmlformats.org/drawingml/2006/main" xmlns:r="http://schemas.openxmlformats.org/officeDocument/2006/relationships" xmlns:p="http://schemas.openxmlformats.org/presentationml/2006/main" type="objTx" preserve="1">
+<p:sldLayout xmlns:a="http://schemas.openxmlformats.org/drawingml/2006/main" xmlns:r="http://schemas.openxmlformats.org/officeDocument/2006/relationships" xmlns:p="http://schemas.openxmlformats.org/presentationml/2006/main" showMasterSp="0" type="objTx" preserve="1">
   <p:cSld name="Content with Caption">
     <p:spTree>
       <p:nvGrpSpPr>
@@ -4587,6 +5306,71 @@
       </p:grpSpPr>
       <p:sp>
         <p:nvSpPr>
+          <p:cNvPr id="8" name="Rectangle 7"/>
+          <p:cNvSpPr/>
+          <p:nvPr/>
+        </p:nvSpPr>
+        <p:spPr>
+          <a:xfrm>
+            <a:off x="8303740" y="0"/>
+            <a:ext cx="3888259" cy="6857999"/>
+          </a:xfrm>
+          <a:prstGeom prst="rect">
+            <a:avLst/>
+          </a:prstGeom>
+          <a:blipFill dpi="0" rotWithShape="1">
+            <a:blip r:embed="rId2">
+              <a:alphaModFix amt="60000"/>
+              <a:lum bright="70000" contrast="-70000"/>
+              <a:extLst>
+                <a:ext uri="{BEBA8EAE-BF5A-486C-A8C5-ECC9F3942E4B}">
+                  <a14:imgProps xmlns:a14="http://schemas.microsoft.com/office/drawing/2010/main">
+                    <a14:imgLayer r:embed="rId3">
+                      <a14:imgEffect>
+                        <a14:sharpenSoften amount="61000"/>
+                      </a14:imgEffect>
+                    </a14:imgLayer>
+                  </a14:imgProps>
+                </a:ext>
+                <a:ext uri="{28A0092B-C50C-407E-A947-70E740481C1C}">
+                  <a14:useLocalDpi xmlns:a14="http://schemas.microsoft.com/office/drawing/2010/main" val="0"/>
+                </a:ext>
+              </a:extLst>
+            </a:blip>
+            <a:srcRect/>
+            <a:tile tx="0" ty="-704850" sx="92000" sy="89000" flip="xy" algn="ctr"/>
+          </a:blipFill>
+          <a:ln>
+            <a:noFill/>
+          </a:ln>
+        </p:spPr>
+        <p:style>
+          <a:lnRef idx="2">
+            <a:schemeClr val="accent1">
+              <a:shade val="50000"/>
+            </a:schemeClr>
+          </a:lnRef>
+          <a:fillRef idx="1">
+            <a:schemeClr val="accent1"/>
+          </a:fillRef>
+          <a:effectRef idx="0">
+            <a:schemeClr val="accent1"/>
+          </a:effectRef>
+          <a:fontRef idx="minor">
+            <a:schemeClr val="lt1"/>
+          </a:fontRef>
+        </p:style>
+        <p:txBody>
+          <a:bodyPr rtlCol="0" anchor="ctr"/>
+          <a:lstStyle/>
+          <a:p>
+            <a:pPr algn="ctr"/>
+            <a:endParaRPr lang="en-US"/>
+          </a:p>
+        </p:txBody>
+      </p:sp>
+      <p:sp>
+        <p:nvSpPr>
           <p:cNvPr id="2" name="Title 1"/>
           <p:cNvSpPr>
             <a:spLocks noGrp="1"/>
@@ -4597,15 +5381,17 @@
         </p:nvSpPr>
         <p:spPr>
           <a:xfrm>
-            <a:off x="839788" y="457200"/>
-            <a:ext cx="3932237" cy="1600200"/>
+            <a:off x="8549640" y="685800"/>
+            <a:ext cx="3200400" cy="1737360"/>
           </a:xfrm>
         </p:spPr>
         <p:txBody>
-          <a:bodyPr anchor="b"/>
+          <a:bodyPr anchor="b">
+            <a:normAutofit/>
+          </a:bodyPr>
           <a:lstStyle>
             <a:lvl1pPr>
-              <a:defRPr sz="3200"/>
+              <a:defRPr sz="3200" b="1"/>
             </a:lvl1pPr>
           </a:lstStyle>
           <a:p>
@@ -4613,7 +5399,7 @@
               <a:rPr lang="en-US" smtClean="0"/>
               <a:t>Click to edit Master title style</a:t>
             </a:r>
-            <a:endParaRPr lang="en-US"/>
+            <a:endParaRPr lang="en-US" dirty="0"/>
           </a:p>
         </p:txBody>
       </p:sp>
@@ -4629,27 +5415,27 @@
         </p:nvSpPr>
         <p:spPr>
           <a:xfrm>
-            <a:off x="5183188" y="987425"/>
-            <a:ext cx="6172200" cy="4873625"/>
+            <a:off x="838200" y="685800"/>
+            <a:ext cx="6711696" cy="5020056"/>
           </a:xfrm>
         </p:spPr>
         <p:txBody>
           <a:bodyPr/>
           <a:lstStyle>
             <a:lvl1pPr>
-              <a:defRPr sz="3200"/>
+              <a:defRPr sz="2000"/>
             </a:lvl1pPr>
             <a:lvl2pPr>
-              <a:defRPr sz="2800"/>
+              <a:defRPr sz="1800"/>
             </a:lvl2pPr>
             <a:lvl3pPr>
-              <a:defRPr sz="2400"/>
+              <a:defRPr sz="1600"/>
             </a:lvl3pPr>
             <a:lvl4pPr>
-              <a:defRPr sz="2000"/>
+              <a:defRPr sz="1600"/>
             </a:lvl4pPr>
             <a:lvl5pPr>
-              <a:defRPr sz="2000"/>
+              <a:defRPr sz="1600"/>
             </a:lvl5pPr>
             <a:lvl6pPr>
               <a:defRPr sz="2000"/>
@@ -4698,7 +5484,7 @@
               <a:rPr lang="en-US" smtClean="0"/>
               <a:t>Fifth level</a:t>
             </a:r>
-            <a:endParaRPr lang="en-US"/>
+            <a:endParaRPr lang="en-US" dirty="0"/>
           </a:p>
         </p:txBody>
       </p:sp>
@@ -4714,48 +5500,62 @@
         </p:nvSpPr>
         <p:spPr>
           <a:xfrm>
-            <a:off x="839788" y="2057400"/>
-            <a:ext cx="3932237" cy="3811588"/>
+            <a:off x="8549640" y="2423160"/>
+            <a:ext cx="3200400" cy="3291840"/>
           </a:xfrm>
         </p:spPr>
         <p:txBody>
-          <a:bodyPr/>
+          <a:bodyPr>
+            <a:normAutofit/>
+          </a:bodyPr>
           <a:lstStyle>
             <a:lvl1pPr marL="0" indent="0">
+              <a:lnSpc>
+                <a:spcPct val="100000"/>
+              </a:lnSpc>
+              <a:spcBef>
+                <a:spcPts val="1000"/>
+              </a:spcBef>
               <a:buNone/>
-              <a:defRPr sz="1600"/>
+              <a:defRPr sz="1400">
+                <a:solidFill>
+                  <a:schemeClr val="accent1">
+                    <a:lumMod val="75000"/>
+                  </a:schemeClr>
+                </a:solidFill>
+              </a:defRPr>
             </a:lvl1pPr>
             <a:lvl2pPr marL="457200" indent="0">
               <a:buNone/>
-              <a:defRPr sz="1400"/>
+              <a:defRPr sz="1200"/>
             </a:lvl2pPr>
             <a:lvl3pPr marL="914400" indent="0">
               <a:buNone/>
-              <a:defRPr sz="1200"/>
+              <a:defRPr sz="1000"/>
             </a:lvl3pPr>
             <a:lvl4pPr marL="1371600" indent="0">
               <a:buNone/>
-              <a:defRPr sz="1000"/>
+              <a:defRPr sz="900"/>
             </a:lvl4pPr>
             <a:lvl5pPr marL="1828800" indent="0">
               <a:buNone/>
-              <a:defRPr sz="1000"/>
+              <a:defRPr sz="900"/>
             </a:lvl5pPr>
             <a:lvl6pPr marL="2286000" indent="0">
               <a:buNone/>
-              <a:defRPr sz="1000"/>
+              <a:defRPr sz="900"/>
             </a:lvl6pPr>
             <a:lvl7pPr marL="2743200" indent="0">
               <a:buNone/>
-              <a:defRPr sz="1000"/>
+              <a:defRPr sz="900"/>
             </a:lvl7pPr>
             <a:lvl8pPr marL="3200400" indent="0">
               <a:buNone/>
-              <a:defRPr sz="1000"/>
+              <a:defRPr sz="900"/>
             </a:lvl8pPr>
             <a:lvl9pPr marL="3657600" indent="0">
               <a:buNone/>
-              <a:defRPr sz="1000"/>
+              <a:defRPr sz="900"/>
             </a:lvl9pPr>
           </a:lstStyle>
           <a:p>
@@ -4784,7 +5584,7 @@
           <a:p>
             <a:fld id="{119DC1D1-559C-EB4C-A5A4-FAAE1895E276}" type="datetimeFigureOut">
               <a:rPr lang="en-US" smtClean="0"/>
-              <a:t>12/1/16</a:t>
+              <a:t>12/4/16</a:t>
             </a:fld>
             <a:endParaRPr lang="en-US"/>
           </a:p>
@@ -4809,6 +5609,169 @@
           </a:p>
         </p:txBody>
       </p:sp>
+      <p:grpSp>
+        <p:nvGrpSpPr>
+          <p:cNvPr id="9" name="Group 8"/>
+          <p:cNvGrpSpPr>
+            <a:grpSpLocks noChangeAspect="1"/>
+          </p:cNvGrpSpPr>
+          <p:nvPr/>
+        </p:nvGrpSpPr>
+        <p:grpSpPr>
+          <a:xfrm>
+            <a:off x="11401725" y="6229681"/>
+            <a:ext cx="457200" cy="457200"/>
+            <a:chOff x="11361456" y="6195813"/>
+            <a:chExt cx="548640" cy="548640"/>
+          </a:xfrm>
+        </p:grpSpPr>
+        <p:sp>
+          <p:nvSpPr>
+            <p:cNvPr id="10" name="Oval 9"/>
+            <p:cNvSpPr/>
+            <p:nvPr/>
+          </p:nvSpPr>
+          <p:spPr>
+            <a:xfrm>
+              <a:off x="11361456" y="6195813"/>
+              <a:ext cx="548640" cy="548640"/>
+            </a:xfrm>
+            <a:prstGeom prst="ellipse">
+              <a:avLst/>
+            </a:prstGeom>
+            <a:blipFill dpi="0" rotWithShape="1">
+              <a:blip r:embed="rId4">
+                <a:duotone>
+                  <a:schemeClr val="accent1">
+                    <a:shade val="45000"/>
+                    <a:satMod val="135000"/>
+                  </a:schemeClr>
+                  <a:prstClr val="white"/>
+                </a:duotone>
+                <a:extLst>
+                  <a:ext uri="{BEBA8EAE-BF5A-486C-A8C5-ECC9F3942E4B}">
+                    <a14:imgProps xmlns:a14="http://schemas.microsoft.com/office/drawing/2010/main">
+                      <a14:imgLayer r:embed="rId5">
+                        <a14:imgEffect>
+                          <a14:saturation sat="95000"/>
+                        </a14:imgEffect>
+                        <a14:imgEffect>
+                          <a14:brightnessContrast bright="-40000" contrast="20000"/>
+                        </a14:imgEffect>
+                      </a14:imgLayer>
+                    </a14:imgProps>
+                  </a:ext>
+                </a:extLst>
+              </a:blip>
+              <a:srcRect/>
+              <a:tile tx="50800" ty="0" sx="85000" sy="85000" flip="none" algn="tl"/>
+            </a:blipFill>
+            <a:ln w="25400" cap="flat" cmpd="sng" algn="ctr">
+              <a:noFill/>
+              <a:prstDash val="solid"/>
+            </a:ln>
+            <a:effectLst/>
+          </p:spPr>
+          <p:txBody>
+            <a:bodyPr lIns="0" tIns="0" rIns="0" bIns="0" rtlCol="0" anchor="ctr"/>
+            <a:lstStyle/>
+            <a:p>
+              <a:pPr marL="0" marR="0" lvl="0" indent="0" algn="ctr" defTabSz="914400" eaLnBrk="1" fontAlgn="auto" latinLnBrk="0" hangingPunct="1">
+                <a:lnSpc>
+                  <a:spcPct val="100000"/>
+                </a:lnSpc>
+                <a:spcBef>
+                  <a:spcPts val="0"/>
+                </a:spcBef>
+                <a:spcAft>
+                  <a:spcPts val="0"/>
+                </a:spcAft>
+                <a:buClrTx/>
+                <a:buSzTx/>
+                <a:buFontTx/>
+                <a:buNone/>
+                <a:tabLst/>
+                <a:defRPr/>
+              </a:pPr>
+              <a:endParaRPr kumimoji="0" lang="en-US" sz="2000" b="0" i="0" u="none" strike="noStrike" kern="0" cap="none" spc="0" normalizeH="0" baseline="0" noProof="0" dirty="0">
+                <a:ln>
+                  <a:noFill/>
+                </a:ln>
+                <a:solidFill>
+                  <a:prstClr val="white"/>
+                </a:solidFill>
+                <a:effectLst/>
+                <a:uLnTx/>
+                <a:uFillTx/>
+                <a:latin typeface="Rockwell Extra Bold" pitchFamily="18" charset="0"/>
+                <a:ea typeface="+mn-ea"/>
+                <a:cs typeface="+mn-cs"/>
+              </a:endParaRPr>
+            </a:p>
+          </p:txBody>
+        </p:sp>
+        <p:sp>
+          <p:nvSpPr>
+            <p:cNvPr id="11" name="Oval 10"/>
+            <p:cNvSpPr/>
+            <p:nvPr/>
+          </p:nvSpPr>
+          <p:spPr>
+            <a:xfrm>
+              <a:off x="11396488" y="6230844"/>
+              <a:ext cx="478576" cy="478578"/>
+            </a:xfrm>
+            <a:prstGeom prst="ellipse">
+              <a:avLst/>
+            </a:prstGeom>
+            <a:noFill/>
+            <a:ln w="12700" cap="flat" cmpd="sng" algn="ctr">
+              <a:solidFill>
+                <a:sysClr val="window" lastClr="FFFFFF"/>
+              </a:solidFill>
+              <a:prstDash val="solid"/>
+            </a:ln>
+            <a:effectLst/>
+          </p:spPr>
+          <p:txBody>
+            <a:bodyPr rtlCol="0" anchor="ctr"/>
+            <a:lstStyle/>
+            <a:p>
+              <a:pPr marL="0" marR="0" lvl="0" indent="0" algn="ctr" defTabSz="914400" eaLnBrk="1" fontAlgn="auto" latinLnBrk="0" hangingPunct="1">
+                <a:lnSpc>
+                  <a:spcPct val="100000"/>
+                </a:lnSpc>
+                <a:spcBef>
+                  <a:spcPts val="0"/>
+                </a:spcBef>
+                <a:spcAft>
+                  <a:spcPts val="0"/>
+                </a:spcAft>
+                <a:buClrTx/>
+                <a:buSzTx/>
+                <a:buFontTx/>
+                <a:buNone/>
+                <a:tabLst/>
+                <a:defRPr/>
+              </a:pPr>
+              <a:endParaRPr kumimoji="0" lang="en-US" sz="1800" b="0" i="0" u="none" strike="noStrike" kern="0" cap="none" spc="0" normalizeH="0" baseline="0" noProof="0" dirty="0">
+                <a:ln>
+                  <a:noFill/>
+                </a:ln>
+                <a:solidFill>
+                  <a:prstClr val="white"/>
+                </a:solidFill>
+                <a:effectLst/>
+                <a:uLnTx/>
+                <a:uFillTx/>
+                <a:latin typeface="Calibri"/>
+                <a:ea typeface="+mn-ea"/>
+                <a:cs typeface="+mn-cs"/>
+              </a:endParaRPr>
+            </a:p>
+          </p:txBody>
+        </p:sp>
+      </p:grpSp>
       <p:sp>
         <p:nvSpPr>
           <p:cNvPr id="7" name="Slide Number Placeholder 6"/>
@@ -4833,11 +5796,7 @@
         </p:txBody>
       </p:sp>
     </p:spTree>
-    <p:extLst>
-      <p:ext uri="{BB962C8B-B14F-4D97-AF65-F5344CB8AC3E}">
-        <p14:creationId xmlns:p14="http://schemas.microsoft.com/office/powerpoint/2010/main" val="1088026227"/>
-      </p:ext>
-    </p:extLst>
+    <p:extLst/>
   </p:cSld>
   <p:clrMapOvr>
     <a:masterClrMapping/>
@@ -4846,7 +5805,7 @@
 </file>
 
 <file path=ppt/slideLayouts/slideLayout9.xml><?xml version="1.0" encoding="utf-8"?>
-<p:sldLayout xmlns:a="http://schemas.openxmlformats.org/drawingml/2006/main" xmlns:r="http://schemas.openxmlformats.org/officeDocument/2006/relationships" xmlns:p="http://schemas.openxmlformats.org/presentationml/2006/main" type="picTx" preserve="1">
+<p:sldLayout xmlns:a="http://schemas.openxmlformats.org/drawingml/2006/main" xmlns:r="http://schemas.openxmlformats.org/officeDocument/2006/relationships" xmlns:p="http://schemas.openxmlformats.org/presentationml/2006/main" showMasterSp="0" type="picTx" preserve="1">
   <p:cSld name="Picture with Caption">
     <p:spTree>
       <p:nvGrpSpPr>
@@ -4864,6 +5823,71 @@
       </p:grpSpPr>
       <p:sp>
         <p:nvSpPr>
+          <p:cNvPr id="11" name="Rectangle 10"/>
+          <p:cNvSpPr/>
+          <p:nvPr/>
+        </p:nvSpPr>
+        <p:spPr>
+          <a:xfrm>
+            <a:off x="8303740" y="0"/>
+            <a:ext cx="3888259" cy="6857999"/>
+          </a:xfrm>
+          <a:prstGeom prst="rect">
+            <a:avLst/>
+          </a:prstGeom>
+          <a:blipFill dpi="0" rotWithShape="1">
+            <a:blip r:embed="rId2">
+              <a:alphaModFix amt="60000"/>
+              <a:lum bright="70000" contrast="-70000"/>
+              <a:extLst>
+                <a:ext uri="{BEBA8EAE-BF5A-486C-A8C5-ECC9F3942E4B}">
+                  <a14:imgProps xmlns:a14="http://schemas.microsoft.com/office/drawing/2010/main">
+                    <a14:imgLayer r:embed="rId3">
+                      <a14:imgEffect>
+                        <a14:sharpenSoften amount="61000"/>
+                      </a14:imgEffect>
+                    </a14:imgLayer>
+                  </a14:imgProps>
+                </a:ext>
+                <a:ext uri="{28A0092B-C50C-407E-A947-70E740481C1C}">
+                  <a14:useLocalDpi xmlns:a14="http://schemas.microsoft.com/office/drawing/2010/main" val="0"/>
+                </a:ext>
+              </a:extLst>
+            </a:blip>
+            <a:srcRect/>
+            <a:tile tx="0" ty="-704850" sx="92000" sy="89000" flip="xy" algn="ctr"/>
+          </a:blipFill>
+          <a:ln>
+            <a:noFill/>
+          </a:ln>
+        </p:spPr>
+        <p:style>
+          <a:lnRef idx="2">
+            <a:schemeClr val="accent1">
+              <a:shade val="50000"/>
+            </a:schemeClr>
+          </a:lnRef>
+          <a:fillRef idx="1">
+            <a:schemeClr val="accent1"/>
+          </a:fillRef>
+          <a:effectRef idx="0">
+            <a:schemeClr val="accent1"/>
+          </a:effectRef>
+          <a:fontRef idx="minor">
+            <a:schemeClr val="lt1"/>
+          </a:fontRef>
+        </p:style>
+        <p:txBody>
+          <a:bodyPr rtlCol="0" anchor="ctr"/>
+          <a:lstStyle/>
+          <a:p>
+            <a:pPr algn="ctr"/>
+            <a:endParaRPr lang="en-US"/>
+          </a:p>
+        </p:txBody>
+      </p:sp>
+      <p:sp>
+        <p:nvSpPr>
           <p:cNvPr id="2" name="Title 1"/>
           <p:cNvSpPr>
             <a:spLocks noGrp="1"/>
@@ -4874,15 +5898,17 @@
         </p:nvSpPr>
         <p:spPr>
           <a:xfrm>
-            <a:off x="839788" y="457200"/>
-            <a:ext cx="3932237" cy="1600200"/>
+            <a:off x="8549640" y="685800"/>
+            <a:ext cx="3200400" cy="1737360"/>
           </a:xfrm>
         </p:spPr>
         <p:txBody>
-          <a:bodyPr anchor="b"/>
+          <a:bodyPr anchor="b">
+            <a:normAutofit/>
+          </a:bodyPr>
           <a:lstStyle>
             <a:lvl1pPr>
-              <a:defRPr sz="3200"/>
+              <a:defRPr sz="3200" b="1"/>
             </a:lvl1pPr>
           </a:lstStyle>
           <a:p>
@@ -4890,7 +5916,7 @@
               <a:rPr lang="en-US" smtClean="0"/>
               <a:t>Click to edit Master title style</a:t>
             </a:r>
-            <a:endParaRPr lang="en-US"/>
+            <a:endParaRPr lang="en-US" dirty="0"/>
           </a:p>
         </p:txBody>
       </p:sp>
@@ -4906,9 +5932,15 @@
         </p:nvSpPr>
         <p:spPr>
           <a:xfrm>
-            <a:off x="5183188" y="987425"/>
-            <a:ext cx="6172200" cy="4873625"/>
+            <a:off x="0" y="0"/>
+            <a:ext cx="8303740" cy="6858000"/>
           </a:xfrm>
+          <a:solidFill>
+            <a:schemeClr val="tx2">
+              <a:lumMod val="20000"/>
+              <a:lumOff val="80000"/>
+            </a:schemeClr>
+          </a:solidFill>
         </p:spPr>
         <p:txBody>
           <a:bodyPr/>
@@ -4951,7 +5983,11 @@
             </a:lvl9pPr>
           </a:lstStyle>
           <a:p>
-            <a:endParaRPr lang="en-US"/>
+            <a:r>
+              <a:rPr lang="en-US" smtClean="0"/>
+              <a:t>Drag picture to placeholder or click icon to add</a:t>
+            </a:r>
+            <a:endParaRPr lang="en-US" dirty="0"/>
           </a:p>
         </p:txBody>
       </p:sp>
@@ -4967,48 +6003,62 @@
         </p:nvSpPr>
         <p:spPr>
           <a:xfrm>
-            <a:off x="839788" y="2057400"/>
-            <a:ext cx="3932237" cy="3811588"/>
+            <a:off x="8549640" y="2423160"/>
+            <a:ext cx="3200400" cy="3291840"/>
           </a:xfrm>
         </p:spPr>
         <p:txBody>
-          <a:bodyPr/>
+          <a:bodyPr>
+            <a:normAutofit/>
+          </a:bodyPr>
           <a:lstStyle>
             <a:lvl1pPr marL="0" indent="0">
+              <a:lnSpc>
+                <a:spcPct val="100000"/>
+              </a:lnSpc>
+              <a:spcBef>
+                <a:spcPts val="1000"/>
+              </a:spcBef>
               <a:buNone/>
-              <a:defRPr sz="1600"/>
+              <a:defRPr sz="1400">
+                <a:solidFill>
+                  <a:schemeClr val="accent1">
+                    <a:lumMod val="75000"/>
+                  </a:schemeClr>
+                </a:solidFill>
+              </a:defRPr>
             </a:lvl1pPr>
             <a:lvl2pPr marL="457200" indent="0">
               <a:buNone/>
-              <a:defRPr sz="1400"/>
+              <a:defRPr sz="1200"/>
             </a:lvl2pPr>
             <a:lvl3pPr marL="914400" indent="0">
               <a:buNone/>
-              <a:defRPr sz="1200"/>
+              <a:defRPr sz="1000"/>
             </a:lvl3pPr>
             <a:lvl4pPr marL="1371600" indent="0">
               <a:buNone/>
-              <a:defRPr sz="1000"/>
+              <a:defRPr sz="900"/>
             </a:lvl4pPr>
             <a:lvl5pPr marL="1828800" indent="0">
               <a:buNone/>
-              <a:defRPr sz="1000"/>
+              <a:defRPr sz="900"/>
             </a:lvl5pPr>
             <a:lvl6pPr marL="2286000" indent="0">
               <a:buNone/>
-              <a:defRPr sz="1000"/>
+              <a:defRPr sz="900"/>
             </a:lvl6pPr>
             <a:lvl7pPr marL="2743200" indent="0">
               <a:buNone/>
-              <a:defRPr sz="1000"/>
+              <a:defRPr sz="900"/>
             </a:lvl7pPr>
             <a:lvl8pPr marL="3200400" indent="0">
               <a:buNone/>
-              <a:defRPr sz="1000"/>
+              <a:defRPr sz="900"/>
             </a:lvl8pPr>
             <a:lvl9pPr marL="3657600" indent="0">
               <a:buNone/>
-              <a:defRPr sz="1000"/>
+              <a:defRPr sz="900"/>
             </a:lvl9pPr>
           </a:lstStyle>
           <a:p>
@@ -5037,31 +6087,175 @@
           <a:p>
             <a:fld id="{119DC1D1-559C-EB4C-A5A4-FAAE1895E276}" type="datetimeFigureOut">
               <a:rPr lang="en-US" smtClean="0"/>
-              <a:t>12/1/16</a:t>
+              <a:t>12/4/16</a:t>
             </a:fld>
             <a:endParaRPr lang="en-US"/>
           </a:p>
         </p:txBody>
       </p:sp>
-      <p:sp>
-        <p:nvSpPr>
-          <p:cNvPr id="6" name="Footer Placeholder 5"/>
-          <p:cNvSpPr>
-            <a:spLocks noGrp="1"/>
-          </p:cNvSpPr>
-          <p:nvPr>
-            <p:ph type="ftr" sz="quarter" idx="11"/>
-          </p:nvPr>
-        </p:nvSpPr>
-        <p:spPr/>
-        <p:txBody>
-          <a:bodyPr/>
-          <a:lstStyle/>
-          <a:p>
-            <a:endParaRPr lang="en-US"/>
-          </a:p>
-        </p:txBody>
-      </p:sp>
+      <p:grpSp>
+        <p:nvGrpSpPr>
+          <p:cNvPr id="8" name="Group 7"/>
+          <p:cNvGrpSpPr>
+            <a:grpSpLocks noChangeAspect="1"/>
+          </p:cNvGrpSpPr>
+          <p:nvPr/>
+        </p:nvGrpSpPr>
+        <p:grpSpPr>
+          <a:xfrm>
+            <a:off x="11401725" y="6229681"/>
+            <a:ext cx="457200" cy="457200"/>
+            <a:chOff x="11361456" y="6195813"/>
+            <a:chExt cx="548640" cy="548640"/>
+          </a:xfrm>
+        </p:grpSpPr>
+        <p:sp>
+          <p:nvSpPr>
+            <p:cNvPr id="9" name="Oval 8"/>
+            <p:cNvSpPr/>
+            <p:nvPr/>
+          </p:nvSpPr>
+          <p:spPr>
+            <a:xfrm>
+              <a:off x="11361456" y="6195813"/>
+              <a:ext cx="548640" cy="548640"/>
+            </a:xfrm>
+            <a:prstGeom prst="ellipse">
+              <a:avLst/>
+            </a:prstGeom>
+            <a:blipFill dpi="0" rotWithShape="1">
+              <a:blip r:embed="rId4">
+                <a:duotone>
+                  <a:schemeClr val="accent1">
+                    <a:shade val="45000"/>
+                    <a:satMod val="135000"/>
+                  </a:schemeClr>
+                  <a:prstClr val="white"/>
+                </a:duotone>
+                <a:extLst>
+                  <a:ext uri="{BEBA8EAE-BF5A-486C-A8C5-ECC9F3942E4B}">
+                    <a14:imgProps xmlns:a14="http://schemas.microsoft.com/office/drawing/2010/main">
+                      <a14:imgLayer r:embed="rId5">
+                        <a14:imgEffect>
+                          <a14:saturation sat="95000"/>
+                        </a14:imgEffect>
+                        <a14:imgEffect>
+                          <a14:brightnessContrast bright="-40000" contrast="20000"/>
+                        </a14:imgEffect>
+                      </a14:imgLayer>
+                    </a14:imgProps>
+                  </a:ext>
+                </a:extLst>
+              </a:blip>
+              <a:srcRect/>
+              <a:tile tx="50800" ty="0" sx="85000" sy="85000" flip="none" algn="tl"/>
+            </a:blipFill>
+            <a:ln w="25400" cap="flat" cmpd="sng" algn="ctr">
+              <a:noFill/>
+              <a:prstDash val="solid"/>
+            </a:ln>
+            <a:effectLst/>
+          </p:spPr>
+          <p:txBody>
+            <a:bodyPr lIns="0" tIns="0" rIns="0" bIns="0" rtlCol="0" anchor="ctr"/>
+            <a:lstStyle/>
+            <a:p>
+              <a:pPr marL="0" marR="0" lvl="0" indent="0" algn="ctr" defTabSz="914400" eaLnBrk="1" fontAlgn="auto" latinLnBrk="0" hangingPunct="1">
+                <a:lnSpc>
+                  <a:spcPct val="100000"/>
+                </a:lnSpc>
+                <a:spcBef>
+                  <a:spcPts val="0"/>
+                </a:spcBef>
+                <a:spcAft>
+                  <a:spcPts val="0"/>
+                </a:spcAft>
+                <a:buClrTx/>
+                <a:buSzTx/>
+                <a:buFontTx/>
+                <a:buNone/>
+                <a:tabLst/>
+                <a:defRPr/>
+              </a:pPr>
+              <a:endParaRPr kumimoji="0" lang="en-US" sz="2000" b="0" i="0" u="none" strike="noStrike" kern="0" cap="none" spc="0" normalizeH="0" baseline="0" noProof="0" dirty="0">
+                <a:ln>
+                  <a:noFill/>
+                </a:ln>
+                <a:solidFill>
+                  <a:prstClr val="white"/>
+                </a:solidFill>
+                <a:effectLst/>
+                <a:uLnTx/>
+                <a:uFillTx/>
+                <a:latin typeface="Rockwell Extra Bold" pitchFamily="18" charset="0"/>
+                <a:ea typeface="+mn-ea"/>
+                <a:cs typeface="+mn-cs"/>
+              </a:endParaRPr>
+            </a:p>
+          </p:txBody>
+        </p:sp>
+        <p:sp>
+          <p:nvSpPr>
+            <p:cNvPr id="10" name="Oval 9"/>
+            <p:cNvSpPr/>
+            <p:nvPr/>
+          </p:nvSpPr>
+          <p:spPr>
+            <a:xfrm>
+              <a:off x="11396488" y="6230844"/>
+              <a:ext cx="478576" cy="478578"/>
+            </a:xfrm>
+            <a:prstGeom prst="ellipse">
+              <a:avLst/>
+            </a:prstGeom>
+            <a:noFill/>
+            <a:ln w="12700" cap="flat" cmpd="sng" algn="ctr">
+              <a:solidFill>
+                <a:sysClr val="window" lastClr="FFFFFF"/>
+              </a:solidFill>
+              <a:prstDash val="solid"/>
+            </a:ln>
+            <a:effectLst/>
+          </p:spPr>
+          <p:txBody>
+            <a:bodyPr rtlCol="0" anchor="ctr"/>
+            <a:lstStyle/>
+            <a:p>
+              <a:pPr marL="0" marR="0" lvl="0" indent="0" algn="ctr" defTabSz="914400" eaLnBrk="1" fontAlgn="auto" latinLnBrk="0" hangingPunct="1">
+                <a:lnSpc>
+                  <a:spcPct val="100000"/>
+                </a:lnSpc>
+                <a:spcBef>
+                  <a:spcPts val="0"/>
+                </a:spcBef>
+                <a:spcAft>
+                  <a:spcPts val="0"/>
+                </a:spcAft>
+                <a:buClrTx/>
+                <a:buSzTx/>
+                <a:buFontTx/>
+                <a:buNone/>
+                <a:tabLst/>
+                <a:defRPr/>
+              </a:pPr>
+              <a:endParaRPr kumimoji="0" lang="en-US" sz="1800" b="0" i="0" u="none" strike="noStrike" kern="0" cap="none" spc="0" normalizeH="0" baseline="0" noProof="0" dirty="0">
+                <a:ln>
+                  <a:noFill/>
+                </a:ln>
+                <a:solidFill>
+                  <a:prstClr val="white"/>
+                </a:solidFill>
+                <a:effectLst/>
+                <a:uLnTx/>
+                <a:uFillTx/>
+                <a:latin typeface="Calibri"/>
+                <a:ea typeface="+mn-ea"/>
+                <a:cs typeface="+mn-cs"/>
+              </a:endParaRPr>
+            </a:p>
+          </p:txBody>
+        </p:sp>
+      </p:grpSp>
       <p:sp>
         <p:nvSpPr>
           <p:cNvPr id="7" name="Slide Number Placeholder 6"/>
@@ -5086,11 +6280,7 @@
         </p:txBody>
       </p:sp>
     </p:spTree>
-    <p:extLst>
-      <p:ext uri="{BB962C8B-B14F-4D97-AF65-F5344CB8AC3E}">
-        <p14:creationId xmlns:p14="http://schemas.microsoft.com/office/powerpoint/2010/main" val="633542984"/>
-      </p:ext>
-    </p:extLst>
+    <p:extLst/>
   </p:cSld>
   <p:clrMapOvr>
     <a:masterClrMapping/>
@@ -5132,8 +6322,8 @@
         </p:nvSpPr>
         <p:spPr>
           <a:xfrm>
-            <a:off x="838200" y="365125"/>
-            <a:ext cx="10515600" cy="1325563"/>
+            <a:off x="1069848" y="484632"/>
+            <a:ext cx="10058400" cy="1609344"/>
           </a:xfrm>
           <a:prstGeom prst="rect">
             <a:avLst/>
@@ -5149,7 +6339,7 @@
               <a:rPr lang="en-US" smtClean="0"/>
               <a:t>Click to edit Master title style</a:t>
             </a:r>
-            <a:endParaRPr lang="en-US"/>
+            <a:endParaRPr lang="en-US" dirty="0"/>
           </a:p>
         </p:txBody>
       </p:sp>
@@ -5165,8 +6355,8 @@
         </p:nvSpPr>
         <p:spPr>
           <a:xfrm>
-            <a:off x="838200" y="1825625"/>
-            <a:ext cx="10515600" cy="4351338"/>
+            <a:off x="1069848" y="2121408"/>
+            <a:ext cx="10058400" cy="4050792"/>
           </a:xfrm>
           <a:prstGeom prst="rect">
             <a:avLst/>
@@ -5211,7 +6401,7 @@
               <a:rPr lang="en-US" smtClean="0"/>
               <a:t>Fifth level</a:t>
             </a:r>
-            <a:endParaRPr lang="en-US"/>
+            <a:endParaRPr lang="en-US" dirty="0"/>
           </a:p>
         </p:txBody>
       </p:sp>
@@ -5227,8 +6417,8 @@
         </p:nvSpPr>
         <p:spPr>
           <a:xfrm>
-            <a:off x="838200" y="6356350"/>
-            <a:ext cx="2743200" cy="365125"/>
+            <a:off x="7964424" y="6272784"/>
+            <a:ext cx="3273552" cy="365125"/>
           </a:xfrm>
           <a:prstGeom prst="rect">
             <a:avLst/>
@@ -5237,12 +6427,10 @@
         <p:txBody>
           <a:bodyPr vert="horz" lIns="91440" tIns="45720" rIns="91440" bIns="45720" rtlCol="0" anchor="ctr"/>
           <a:lstStyle>
-            <a:lvl1pPr algn="l">
-              <a:defRPr sz="1200">
+            <a:lvl1pPr algn="r">
+              <a:defRPr sz="1100">
                 <a:solidFill>
-                  <a:schemeClr val="tx1">
-                    <a:tint val="75000"/>
-                  </a:schemeClr>
+                  <a:schemeClr val="tx2"/>
                 </a:solidFill>
               </a:defRPr>
             </a:lvl1pPr>
@@ -5250,7 +6438,7 @@
           <a:p>
             <a:fld id="{119DC1D1-559C-EB4C-A5A4-FAAE1895E276}" type="datetimeFigureOut">
               <a:rPr lang="en-US" smtClean="0"/>
-              <a:t>12/1/16</a:t>
+              <a:t>12/4/16</a:t>
             </a:fld>
             <a:endParaRPr lang="en-US"/>
           </a:p>
@@ -5268,8 +6456,8 @@
         </p:nvSpPr>
         <p:spPr>
           <a:xfrm>
-            <a:off x="4038600" y="6356350"/>
-            <a:ext cx="4114800" cy="365125"/>
+            <a:off x="1088136" y="6272784"/>
+            <a:ext cx="6327648" cy="365125"/>
           </a:xfrm>
           <a:prstGeom prst="rect">
             <a:avLst/>
@@ -5278,12 +6466,10 @@
         <p:txBody>
           <a:bodyPr vert="horz" lIns="91440" tIns="45720" rIns="91440" bIns="45720" rtlCol="0" anchor="ctr"/>
           <a:lstStyle>
-            <a:lvl1pPr algn="ctr">
-              <a:defRPr sz="1200">
+            <a:lvl1pPr algn="l">
+              <a:defRPr sz="1100">
                 <a:solidFill>
-                  <a:schemeClr val="tx1">
-                    <a:tint val="75000"/>
-                  </a:schemeClr>
+                  <a:schemeClr val="tx2"/>
                 </a:solidFill>
               </a:defRPr>
             </a:lvl1pPr>
@@ -5293,6 +6479,169 @@
           </a:p>
         </p:txBody>
       </p:sp>
+      <p:grpSp>
+        <p:nvGrpSpPr>
+          <p:cNvPr id="7" name="Group 6"/>
+          <p:cNvGrpSpPr>
+            <a:grpSpLocks noChangeAspect="1"/>
+          </p:cNvGrpSpPr>
+          <p:nvPr/>
+        </p:nvGrpSpPr>
+        <p:grpSpPr>
+          <a:xfrm>
+            <a:off x="11401725" y="6229681"/>
+            <a:ext cx="457200" cy="457200"/>
+            <a:chOff x="11361456" y="6195813"/>
+            <a:chExt cx="548640" cy="548640"/>
+          </a:xfrm>
+        </p:grpSpPr>
+        <p:sp>
+          <p:nvSpPr>
+            <p:cNvPr id="8" name="Oval 7"/>
+            <p:cNvSpPr/>
+            <p:nvPr/>
+          </p:nvSpPr>
+          <p:spPr>
+            <a:xfrm>
+              <a:off x="11361456" y="6195813"/>
+              <a:ext cx="548640" cy="548640"/>
+            </a:xfrm>
+            <a:prstGeom prst="ellipse">
+              <a:avLst/>
+            </a:prstGeom>
+            <a:blipFill dpi="0" rotWithShape="1">
+              <a:blip r:embed="rId13">
+                <a:duotone>
+                  <a:schemeClr val="accent1">
+                    <a:shade val="45000"/>
+                    <a:satMod val="135000"/>
+                  </a:schemeClr>
+                  <a:prstClr val="white"/>
+                </a:duotone>
+                <a:extLst>
+                  <a:ext uri="{BEBA8EAE-BF5A-486C-A8C5-ECC9F3942E4B}">
+                    <a14:imgProps xmlns:a14="http://schemas.microsoft.com/office/drawing/2010/main">
+                      <a14:imgLayer r:embed="rId14">
+                        <a14:imgEffect>
+                          <a14:saturation sat="95000"/>
+                        </a14:imgEffect>
+                        <a14:imgEffect>
+                          <a14:brightnessContrast bright="-40000" contrast="20000"/>
+                        </a14:imgEffect>
+                      </a14:imgLayer>
+                    </a14:imgProps>
+                  </a:ext>
+                </a:extLst>
+              </a:blip>
+              <a:srcRect/>
+              <a:tile tx="50800" ty="0" sx="85000" sy="85000" flip="none" algn="tl"/>
+            </a:blipFill>
+            <a:ln w="25400" cap="flat" cmpd="sng" algn="ctr">
+              <a:noFill/>
+              <a:prstDash val="solid"/>
+            </a:ln>
+            <a:effectLst/>
+          </p:spPr>
+          <p:txBody>
+            <a:bodyPr lIns="0" tIns="0" rIns="0" bIns="0" rtlCol="0" anchor="ctr"/>
+            <a:lstStyle/>
+            <a:p>
+              <a:pPr marL="0" marR="0" lvl="0" indent="0" algn="ctr" defTabSz="914400" eaLnBrk="1" fontAlgn="auto" latinLnBrk="0" hangingPunct="1">
+                <a:lnSpc>
+                  <a:spcPct val="100000"/>
+                </a:lnSpc>
+                <a:spcBef>
+                  <a:spcPts val="0"/>
+                </a:spcBef>
+                <a:spcAft>
+                  <a:spcPts val="0"/>
+                </a:spcAft>
+                <a:buClrTx/>
+                <a:buSzTx/>
+                <a:buFontTx/>
+                <a:buNone/>
+                <a:tabLst/>
+                <a:defRPr/>
+              </a:pPr>
+              <a:endParaRPr kumimoji="0" lang="en-US" sz="2000" b="0" i="0" u="none" strike="noStrike" kern="0" cap="none" spc="0" normalizeH="0" baseline="0" noProof="0" dirty="0">
+                <a:ln>
+                  <a:noFill/>
+                </a:ln>
+                <a:solidFill>
+                  <a:prstClr val="white"/>
+                </a:solidFill>
+                <a:effectLst/>
+                <a:uLnTx/>
+                <a:uFillTx/>
+                <a:latin typeface="Rockwell Extra Bold" pitchFamily="18" charset="0"/>
+                <a:ea typeface="+mn-ea"/>
+                <a:cs typeface="+mn-cs"/>
+              </a:endParaRPr>
+            </a:p>
+          </p:txBody>
+        </p:sp>
+        <p:sp>
+          <p:nvSpPr>
+            <p:cNvPr id="9" name="Oval 8"/>
+            <p:cNvSpPr/>
+            <p:nvPr/>
+          </p:nvSpPr>
+          <p:spPr>
+            <a:xfrm>
+              <a:off x="11396488" y="6230844"/>
+              <a:ext cx="478576" cy="478578"/>
+            </a:xfrm>
+            <a:prstGeom prst="ellipse">
+              <a:avLst/>
+            </a:prstGeom>
+            <a:noFill/>
+            <a:ln w="12700" cap="flat" cmpd="sng" algn="ctr">
+              <a:solidFill>
+                <a:srgbClr val="FFFFFF"/>
+              </a:solidFill>
+              <a:prstDash val="solid"/>
+            </a:ln>
+            <a:effectLst/>
+          </p:spPr>
+          <p:txBody>
+            <a:bodyPr rtlCol="0" anchor="ctr"/>
+            <a:lstStyle/>
+            <a:p>
+              <a:pPr marL="0" marR="0" lvl="0" indent="0" algn="ctr" defTabSz="914400" eaLnBrk="1" fontAlgn="auto" latinLnBrk="0" hangingPunct="1">
+                <a:lnSpc>
+                  <a:spcPct val="100000"/>
+                </a:lnSpc>
+                <a:spcBef>
+                  <a:spcPts val="0"/>
+                </a:spcBef>
+                <a:spcAft>
+                  <a:spcPts val="0"/>
+                </a:spcAft>
+                <a:buClrTx/>
+                <a:buSzTx/>
+                <a:buFontTx/>
+                <a:buNone/>
+                <a:tabLst/>
+                <a:defRPr/>
+              </a:pPr>
+              <a:endParaRPr kumimoji="0" lang="en-US" sz="1800" b="0" i="0" u="none" strike="noStrike" kern="0" cap="none" spc="0" normalizeH="0" baseline="0" noProof="0" dirty="0">
+                <a:ln>
+                  <a:noFill/>
+                </a:ln>
+                <a:solidFill>
+                  <a:prstClr val="white"/>
+                </a:solidFill>
+                <a:effectLst/>
+                <a:uLnTx/>
+                <a:uFillTx/>
+                <a:latin typeface="Calibri"/>
+                <a:ea typeface="+mn-ea"/>
+                <a:cs typeface="+mn-cs"/>
+              </a:endParaRPr>
+            </a:p>
+          </p:txBody>
+        </p:sp>
+      </p:grpSp>
       <p:sp>
         <p:nvSpPr>
           <p:cNvPr id="6" name="Slide Number Placeholder 5"/>
@@ -5305,8 +6654,8 @@
         </p:nvSpPr>
         <p:spPr>
           <a:xfrm>
-            <a:off x="8610600" y="6356350"/>
-            <a:ext cx="2743200" cy="365125"/>
+            <a:off x="11311128" y="6272784"/>
+            <a:ext cx="640080" cy="365125"/>
           </a:xfrm>
           <a:prstGeom prst="rect">
             <a:avLst/>
@@ -5315,13 +6664,12 @@
         <p:txBody>
           <a:bodyPr vert="horz" lIns="91440" tIns="45720" rIns="91440" bIns="45720" rtlCol="0" anchor="ctr"/>
           <a:lstStyle>
-            <a:lvl1pPr algn="r">
-              <a:defRPr sz="1200">
+            <a:lvl1pPr algn="ctr">
+              <a:defRPr sz="1400" b="1">
                 <a:solidFill>
-                  <a:schemeClr val="tx1">
-                    <a:tint val="75000"/>
-                  </a:schemeClr>
+                  <a:srgbClr val="FFFFFF"/>
                 </a:solidFill>
+                <a:latin typeface="+mj-lt"/>
               </a:defRPr>
             </a:lvl1pPr>
           </a:lstStyle>
@@ -5337,23 +6685,23 @@
     </p:spTree>
     <p:extLst>
       <p:ext uri="{BB962C8B-B14F-4D97-AF65-F5344CB8AC3E}">
-        <p14:creationId xmlns:p14="http://schemas.microsoft.com/office/powerpoint/2010/main" val="794156936"/>
+        <p14:creationId xmlns:p14="http://schemas.microsoft.com/office/powerpoint/2010/main" val="642208520"/>
       </p:ext>
     </p:extLst>
   </p:cSld>
   <p:clrMap bg1="lt1" tx1="dk1" bg2="lt2" tx2="dk2" accent1="accent1" accent2="accent2" accent3="accent3" accent4="accent4" accent5="accent5" accent6="accent6" hlink="hlink" folHlink="folHlink"/>
   <p:sldLayoutIdLst>
-    <p:sldLayoutId id="2147483649" r:id="rId1"/>
-    <p:sldLayoutId id="2147483650" r:id="rId2"/>
-    <p:sldLayoutId id="2147483651" r:id="rId3"/>
-    <p:sldLayoutId id="2147483652" r:id="rId4"/>
-    <p:sldLayoutId id="2147483653" r:id="rId5"/>
-    <p:sldLayoutId id="2147483654" r:id="rId6"/>
-    <p:sldLayoutId id="2147483655" r:id="rId7"/>
-    <p:sldLayoutId id="2147483656" r:id="rId8"/>
-    <p:sldLayoutId id="2147483657" r:id="rId9"/>
-    <p:sldLayoutId id="2147483658" r:id="rId10"/>
-    <p:sldLayoutId id="2147483659" r:id="rId11"/>
+    <p:sldLayoutId id="2147483817" r:id="rId1"/>
+    <p:sldLayoutId id="2147483818" r:id="rId2"/>
+    <p:sldLayoutId id="2147483819" r:id="rId3"/>
+    <p:sldLayoutId id="2147483820" r:id="rId4"/>
+    <p:sldLayoutId id="2147483821" r:id="rId5"/>
+    <p:sldLayoutId id="2147483822" r:id="rId6"/>
+    <p:sldLayoutId id="2147483823" r:id="rId7"/>
+    <p:sldLayoutId id="2147483824" r:id="rId8"/>
+    <p:sldLayoutId id="2147483825" r:id="rId9"/>
+    <p:sldLayoutId id="2147483826" r:id="rId10"/>
+    <p:sldLayoutId id="2147483827" r:id="rId11"/>
   </p:sldLayoutIdLst>
   <p:txStyles>
     <p:titleStyle>
@@ -5365,10 +6713,17 @@
           <a:spcPct val="0"/>
         </a:spcBef>
         <a:buNone/>
-        <a:defRPr sz="4400" kern="1200">
-          <a:solidFill>
-            <a:schemeClr val="tx1"/>
-          </a:solidFill>
+        <a:defRPr sz="5400" kern="1200" cap="all" baseline="0">
+          <a:blipFill>
+            <a:blip r:embed="rId15">
+              <a:extLst>
+                <a:ext uri="{28A0092B-C50C-407E-A947-70E740481C1C}">
+                  <a14:useLocalDpi xmlns:a14="http://schemas.microsoft.com/office/drawing/2010/main" val="0"/>
+                </a:ext>
+              </a:extLst>
+            </a:blip>
+            <a:tile tx="6350" ty="-127000" sx="65000" sy="64000" flip="none" algn="tl"/>
+          </a:blipFill>
           <a:latin typeface="+mj-lt"/>
           <a:ea typeface="+mj-ea"/>
           <a:cs typeface="+mj-cs"/>
@@ -5376,16 +6731,22 @@
       </a:lvl1pPr>
     </p:titleStyle>
     <p:bodyStyle>
-      <a:lvl1pPr marL="228600" indent="-228600" algn="l" defTabSz="914400" rtl="0" eaLnBrk="1" latinLnBrk="0" hangingPunct="1">
+      <a:lvl1pPr marL="182880" indent="-182880" algn="l" defTabSz="914400" rtl="0" eaLnBrk="1" latinLnBrk="0" hangingPunct="1">
         <a:lnSpc>
           <a:spcPct val="90000"/>
         </a:lnSpc>
         <a:spcBef>
-          <a:spcPts val="1000"/>
+          <a:spcPts val="1200"/>
         </a:spcBef>
-        <a:buFont typeface="Arial"/>
-        <a:buChar char="•"/>
-        <a:defRPr sz="2800" kern="1200">
+        <a:buClr>
+          <a:schemeClr val="accent1">
+            <a:lumMod val="75000"/>
+          </a:schemeClr>
+        </a:buClr>
+        <a:buSzPct val="85000"/>
+        <a:buFont typeface="Wingdings" pitchFamily="2" charset="2"/>
+        <a:buChar char="§"/>
+        <a:defRPr sz="2000" kern="1200">
           <a:solidFill>
             <a:schemeClr val="tx1"/>
           </a:solidFill>
@@ -5394,16 +6755,25 @@
           <a:cs typeface="+mn-cs"/>
         </a:defRPr>
       </a:lvl1pPr>
-      <a:lvl2pPr marL="685800" indent="-228600" algn="l" defTabSz="914400" rtl="0" eaLnBrk="1" latinLnBrk="0" hangingPunct="1">
+      <a:lvl2pPr marL="457200" indent="-182880" algn="l" defTabSz="914400" rtl="0" eaLnBrk="1" latinLnBrk="0" hangingPunct="1">
         <a:lnSpc>
           <a:spcPct val="90000"/>
         </a:lnSpc>
         <a:spcBef>
-          <a:spcPts val="500"/>
+          <a:spcPts val="400"/>
         </a:spcBef>
-        <a:buFont typeface="Arial"/>
-        <a:buChar char="•"/>
-        <a:defRPr sz="2400" kern="1200">
+        <a:spcAft>
+          <a:spcPts val="200"/>
+        </a:spcAft>
+        <a:buClr>
+          <a:schemeClr val="accent1">
+            <a:lumMod val="75000"/>
+          </a:schemeClr>
+        </a:buClr>
+        <a:buSzPct val="85000"/>
+        <a:buFont typeface="Wingdings" pitchFamily="2" charset="2"/>
+        <a:buChar char="§"/>
+        <a:defRPr sz="1800" kern="1200">
           <a:solidFill>
             <a:schemeClr val="tx1"/>
           </a:solidFill>
@@ -5412,16 +6782,25 @@
           <a:cs typeface="+mn-cs"/>
         </a:defRPr>
       </a:lvl2pPr>
-      <a:lvl3pPr marL="1143000" indent="-228600" algn="l" defTabSz="914400" rtl="0" eaLnBrk="1" latinLnBrk="0" hangingPunct="1">
+      <a:lvl3pPr marL="731520" indent="-182880" algn="l" defTabSz="914400" rtl="0" eaLnBrk="1" latinLnBrk="0" hangingPunct="1">
         <a:lnSpc>
           <a:spcPct val="90000"/>
         </a:lnSpc>
         <a:spcBef>
-          <a:spcPts val="500"/>
+          <a:spcPts val="400"/>
         </a:spcBef>
-        <a:buFont typeface="Arial"/>
-        <a:buChar char="•"/>
-        <a:defRPr sz="2000" kern="1200">
+        <a:spcAft>
+          <a:spcPts val="200"/>
+        </a:spcAft>
+        <a:buClr>
+          <a:schemeClr val="accent1">
+            <a:lumMod val="75000"/>
+          </a:schemeClr>
+        </a:buClr>
+        <a:buSzPct val="85000"/>
+        <a:buFont typeface="Wingdings" pitchFamily="2" charset="2"/>
+        <a:buChar char="§"/>
+        <a:defRPr sz="1600" kern="1200">
           <a:solidFill>
             <a:schemeClr val="tx1"/>
           </a:solidFill>
@@ -5430,16 +6809,25 @@
           <a:cs typeface="+mn-cs"/>
         </a:defRPr>
       </a:lvl3pPr>
-      <a:lvl4pPr marL="1600200" indent="-228600" algn="l" defTabSz="914400" rtl="0" eaLnBrk="1" latinLnBrk="0" hangingPunct="1">
+      <a:lvl4pPr marL="1005840" indent="-182880" algn="l" defTabSz="914400" rtl="0" eaLnBrk="1" latinLnBrk="0" hangingPunct="1">
         <a:lnSpc>
           <a:spcPct val="90000"/>
         </a:lnSpc>
         <a:spcBef>
-          <a:spcPts val="500"/>
+          <a:spcPts val="400"/>
         </a:spcBef>
-        <a:buFont typeface="Arial"/>
-        <a:buChar char="•"/>
-        <a:defRPr sz="1800" kern="1200">
+        <a:spcAft>
+          <a:spcPts val="200"/>
+        </a:spcAft>
+        <a:buClr>
+          <a:schemeClr val="accent1">
+            <a:lumMod val="75000"/>
+          </a:schemeClr>
+        </a:buClr>
+        <a:buSzPct val="85000"/>
+        <a:buFont typeface="Wingdings" pitchFamily="2" charset="2"/>
+        <a:buChar char="§"/>
+        <a:defRPr sz="1600" kern="1200">
           <a:solidFill>
             <a:schemeClr val="tx1"/>
           </a:solidFill>
@@ -5448,16 +6836,25 @@
           <a:cs typeface="+mn-cs"/>
         </a:defRPr>
       </a:lvl4pPr>
-      <a:lvl5pPr marL="2057400" indent="-228600" algn="l" defTabSz="914400" rtl="0" eaLnBrk="1" latinLnBrk="0" hangingPunct="1">
+      <a:lvl5pPr marL="1280160" indent="-182880" algn="l" defTabSz="914400" rtl="0" eaLnBrk="1" latinLnBrk="0" hangingPunct="1">
         <a:lnSpc>
           <a:spcPct val="90000"/>
         </a:lnSpc>
         <a:spcBef>
-          <a:spcPts val="500"/>
+          <a:spcPts val="400"/>
         </a:spcBef>
-        <a:buFont typeface="Arial"/>
-        <a:buChar char="•"/>
-        <a:defRPr sz="1800" kern="1200">
+        <a:spcAft>
+          <a:spcPts val="200"/>
+        </a:spcAft>
+        <a:buClr>
+          <a:schemeClr val="accent1">
+            <a:lumMod val="75000"/>
+          </a:schemeClr>
+        </a:buClr>
+        <a:buSzPct val="85000"/>
+        <a:buFont typeface="Wingdings" pitchFamily="2" charset="2"/>
+        <a:buChar char="§"/>
+        <a:defRPr sz="1600" kern="1200">
           <a:solidFill>
             <a:schemeClr val="tx1"/>
           </a:solidFill>
@@ -5466,16 +6863,25 @@
           <a:cs typeface="+mn-cs"/>
         </a:defRPr>
       </a:lvl5pPr>
-      <a:lvl6pPr marL="2514600" indent="-228600" algn="l" defTabSz="914400" rtl="0" eaLnBrk="1" latinLnBrk="0" hangingPunct="1">
+      <a:lvl6pPr marL="1600000" indent="-228600" algn="l" defTabSz="914400" rtl="0" eaLnBrk="1" latinLnBrk="0" hangingPunct="1">
         <a:lnSpc>
           <a:spcPct val="90000"/>
         </a:lnSpc>
         <a:spcBef>
-          <a:spcPts val="500"/>
+          <a:spcPts val="400"/>
         </a:spcBef>
-        <a:buFont typeface="Arial"/>
-        <a:buChar char="•"/>
-        <a:defRPr sz="1800" kern="1200">
+        <a:spcAft>
+          <a:spcPts val="200"/>
+        </a:spcAft>
+        <a:buClr>
+          <a:schemeClr val="accent1">
+            <a:lumMod val="75000"/>
+          </a:schemeClr>
+        </a:buClr>
+        <a:buSzPct val="85000"/>
+        <a:buFont typeface="Wingdings" pitchFamily="2" charset="2"/>
+        <a:buChar char="§"/>
+        <a:defRPr sz="1600" kern="1200">
           <a:solidFill>
             <a:schemeClr val="tx1"/>
           </a:solidFill>
@@ -5484,16 +6890,25 @@
           <a:cs typeface="+mn-cs"/>
         </a:defRPr>
       </a:lvl6pPr>
-      <a:lvl7pPr marL="2971800" indent="-228600" algn="l" defTabSz="914400" rtl="0" eaLnBrk="1" latinLnBrk="0" hangingPunct="1">
+      <a:lvl7pPr marL="1900000" indent="-228600" algn="l" defTabSz="914400" rtl="0" eaLnBrk="1" latinLnBrk="0" hangingPunct="1">
         <a:lnSpc>
           <a:spcPct val="90000"/>
         </a:lnSpc>
         <a:spcBef>
-          <a:spcPts val="500"/>
+          <a:spcPts val="400"/>
         </a:spcBef>
-        <a:buFont typeface="Arial"/>
-        <a:buChar char="•"/>
-        <a:defRPr sz="1800" kern="1200">
+        <a:spcAft>
+          <a:spcPts val="200"/>
+        </a:spcAft>
+        <a:buClr>
+          <a:schemeClr val="accent1">
+            <a:lumMod val="75000"/>
+          </a:schemeClr>
+        </a:buClr>
+        <a:buSzPct val="85000"/>
+        <a:buFont typeface="Wingdings" pitchFamily="2" charset="2"/>
+        <a:buChar char="§"/>
+        <a:defRPr sz="1600" kern="1200">
           <a:solidFill>
             <a:schemeClr val="tx1"/>
           </a:solidFill>
@@ -5502,16 +6917,25 @@
           <a:cs typeface="+mn-cs"/>
         </a:defRPr>
       </a:lvl7pPr>
-      <a:lvl8pPr marL="3429000" indent="-228600" algn="l" defTabSz="914400" rtl="0" eaLnBrk="1" latinLnBrk="0" hangingPunct="1">
+      <a:lvl8pPr marL="2200000" indent="-228600" algn="l" defTabSz="914400" rtl="0" eaLnBrk="1" latinLnBrk="0" hangingPunct="1">
         <a:lnSpc>
           <a:spcPct val="90000"/>
         </a:lnSpc>
         <a:spcBef>
-          <a:spcPts val="500"/>
+          <a:spcPts val="400"/>
         </a:spcBef>
-        <a:buFont typeface="Arial"/>
-        <a:buChar char="•"/>
-        <a:defRPr sz="1800" kern="1200">
+        <a:spcAft>
+          <a:spcPts val="200"/>
+        </a:spcAft>
+        <a:buClr>
+          <a:schemeClr val="accent1">
+            <a:lumMod val="75000"/>
+          </a:schemeClr>
+        </a:buClr>
+        <a:buSzPct val="85000"/>
+        <a:buFont typeface="Wingdings" pitchFamily="2" charset="2"/>
+        <a:buChar char="§"/>
+        <a:defRPr sz="1600" kern="1200">
           <a:solidFill>
             <a:schemeClr val="tx1"/>
           </a:solidFill>
@@ -5520,16 +6944,25 @@
           <a:cs typeface="+mn-cs"/>
         </a:defRPr>
       </a:lvl8pPr>
-      <a:lvl9pPr marL="3886200" indent="-228600" algn="l" defTabSz="914400" rtl="0" eaLnBrk="1" latinLnBrk="0" hangingPunct="1">
+      <a:lvl9pPr marL="2500000" indent="-228600" algn="l" defTabSz="914400" rtl="0" eaLnBrk="1" latinLnBrk="0" hangingPunct="1">
         <a:lnSpc>
           <a:spcPct val="90000"/>
         </a:lnSpc>
         <a:spcBef>
-          <a:spcPts val="500"/>
+          <a:spcPts val="400"/>
         </a:spcBef>
-        <a:buFont typeface="Arial"/>
-        <a:buChar char="•"/>
-        <a:defRPr sz="1800" kern="1200">
+        <a:spcAft>
+          <a:spcPts val="200"/>
+        </a:spcAft>
+        <a:buClr>
+          <a:schemeClr val="accent1">
+            <a:lumMod val="75000"/>
+          </a:schemeClr>
+        </a:buClr>
+        <a:buSzPct val="85000"/>
+        <a:buFont typeface="Wingdings" pitchFamily="2" charset="2"/>
+        <a:buChar char="§"/>
+        <a:defRPr sz="1600" kern="1200">
           <a:solidFill>
             <a:schemeClr val="tx1"/>
           </a:solidFill>
@@ -5667,10 +7100,16 @@
         </p:nvSpPr>
         <p:spPr/>
         <p:txBody>
-          <a:bodyPr/>
+          <a:bodyPr>
+            <a:normAutofit/>
+          </a:bodyPr>
           <a:lstStyle/>
           <a:p>
-            <a:endParaRPr lang="en-US"/>
+            <a:r>
+              <a:rPr lang="en-US" dirty="0" smtClean="0"/>
+              <a:t>Flow Sensor Compensation</a:t>
+            </a:r>
+            <a:endParaRPr lang="en-US" dirty="0"/>
           </a:p>
         </p:txBody>
       </p:sp>
@@ -5789,7 +7228,7 @@
         </p:blipFill>
         <p:spPr bwMode="auto">
           <a:xfrm>
-            <a:off x="838200" y="2293257"/>
+            <a:off x="826626" y="2710987"/>
             <a:ext cx="7068457" cy="3149425"/>
           </a:xfrm>
           <a:prstGeom prst="rect">
@@ -5852,7 +7291,7 @@
         </p:nvCxnSpPr>
         <p:spPr>
           <a:xfrm>
-            <a:off x="566057" y="2351314"/>
+            <a:off x="1029044" y="1795730"/>
             <a:ext cx="3135089" cy="2061029"/>
           </a:xfrm>
           <a:prstGeom prst="bentConnector3">
@@ -5887,7 +7326,7 @@
         </p:nvCxnSpPr>
         <p:spPr>
           <a:xfrm>
-            <a:off x="3701146" y="2351315"/>
+            <a:off x="4164133" y="1795731"/>
             <a:ext cx="2090060" cy="2061027"/>
           </a:xfrm>
           <a:prstGeom prst="bentConnector3">
@@ -5924,7 +7363,7 @@
         </p:nvCxnSpPr>
         <p:spPr>
           <a:xfrm>
-            <a:off x="3701146" y="2351315"/>
+            <a:off x="4164133" y="1795731"/>
             <a:ext cx="0" cy="2061027"/>
           </a:xfrm>
           <a:prstGeom prst="line">
@@ -5959,7 +7398,7 @@
         </p:nvCxnSpPr>
         <p:spPr>
           <a:xfrm>
-            <a:off x="5791206" y="2351315"/>
+            <a:off x="6254193" y="1795731"/>
             <a:ext cx="2090060" cy="2061027"/>
           </a:xfrm>
           <a:prstGeom prst="bentConnector3">
@@ -5996,7 +7435,7 @@
         </p:nvCxnSpPr>
         <p:spPr>
           <a:xfrm>
-            <a:off x="7881266" y="2351314"/>
+            <a:off x="8344253" y="1795730"/>
             <a:ext cx="2090060" cy="2061027"/>
           </a:xfrm>
           <a:prstGeom prst="bentConnector3">
@@ -6031,7 +7470,7 @@
         </p:nvCxnSpPr>
         <p:spPr>
           <a:xfrm>
-            <a:off x="7881266" y="2351314"/>
+            <a:off x="8344253" y="1795730"/>
             <a:ext cx="0" cy="2061027"/>
           </a:xfrm>
           <a:prstGeom prst="line">
@@ -6066,7 +7505,7 @@
         </p:nvCxnSpPr>
         <p:spPr>
           <a:xfrm>
-            <a:off x="5798472" y="2351314"/>
+            <a:off x="6261459" y="1795730"/>
             <a:ext cx="0" cy="2061027"/>
           </a:xfrm>
           <a:prstGeom prst="line">
@@ -6101,7 +7540,7 @@
         </p:nvCxnSpPr>
         <p:spPr>
           <a:xfrm>
-            <a:off x="2133600" y="3145246"/>
+            <a:off x="2596587" y="2589662"/>
             <a:ext cx="1567546" cy="0"/>
           </a:xfrm>
           <a:prstGeom prst="straightConnector1">
@@ -6140,7 +7579,7 @@
             </p:nvSpPr>
             <p:spPr>
               <a:xfrm>
-                <a:off x="2297813" y="2365826"/>
+                <a:off x="2760800" y="1810242"/>
                 <a:ext cx="1239122" cy="830997"/>
               </a:xfrm>
               <a:prstGeom prst="rect">
@@ -6275,7 +7714,7 @@
             </p:nvSpPr>
             <p:spPr>
               <a:xfrm>
-                <a:off x="2297813" y="2365826"/>
+                <a:off x="2760800" y="1810242"/>
                 <a:ext cx="1239122" cy="830997"/>
               </a:xfrm>
               <a:prstGeom prst="rect">
@@ -6311,7 +7750,7 @@
         </p:nvCxnSpPr>
         <p:spPr>
           <a:xfrm>
-            <a:off x="3701146" y="3145246"/>
+            <a:off x="4164133" y="2589662"/>
             <a:ext cx="1353256" cy="6479"/>
           </a:xfrm>
           <a:prstGeom prst="straightConnector1">
@@ -6350,7 +7789,7 @@
             </p:nvSpPr>
             <p:spPr>
               <a:xfrm>
-                <a:off x="3751097" y="3107119"/>
+                <a:off x="4214084" y="2551535"/>
                 <a:ext cx="1253355" cy="830997"/>
               </a:xfrm>
               <a:prstGeom prst="rect">
@@ -6485,7 +7924,7 @@
             </p:nvSpPr>
             <p:spPr>
               <a:xfrm>
-                <a:off x="3751097" y="3107119"/>
+                <a:off x="4214084" y="2551535"/>
                 <a:ext cx="1253355" cy="830997"/>
               </a:xfrm>
               <a:prstGeom prst="rect">
@@ -6523,7 +7962,7 @@
             </p:nvSpPr>
             <p:spPr>
               <a:xfrm>
-                <a:off x="4037777" y="4803839"/>
+                <a:off x="4931243" y="979837"/>
                 <a:ext cx="6151252" cy="830997"/>
               </a:xfrm>
               <a:prstGeom prst="rect">
@@ -6815,7 +8254,7 @@
             </p:nvSpPr>
             <p:spPr>
               <a:xfrm>
-                <a:off x="4037777" y="4803839"/>
+                <a:off x="4931243" y="979837"/>
                 <a:ext cx="6151252" cy="830997"/>
               </a:xfrm>
               <a:prstGeom prst="rect">
@@ -6843,6 +8282,29 @@
           </p:sp>
         </mc:Fallback>
       </mc:AlternateContent>
+      <p:sp>
+        <p:nvSpPr>
+          <p:cNvPr id="3" name="Subtitle 2"/>
+          <p:cNvSpPr>
+            <a:spLocks noGrp="1"/>
+          </p:cNvSpPr>
+          <p:nvPr>
+            <p:ph type="subTitle" idx="1"/>
+          </p:nvPr>
+        </p:nvSpPr>
+        <p:spPr/>
+        <p:txBody>
+          <a:bodyPr/>
+          <a:lstStyle/>
+          <a:p>
+            <a:r>
+              <a:rPr lang="en-US" dirty="0" smtClean="0"/>
+              <a:t>Terms used later</a:t>
+            </a:r>
+            <a:endParaRPr lang="en-US" dirty="0"/>
+          </a:p>
+        </p:txBody>
+      </p:sp>
     </p:spTree>
     <p:extLst>
       <p:ext uri="{BB962C8B-B14F-4D97-AF65-F5344CB8AC3E}">
@@ -6895,7 +8357,11 @@
           <a:bodyPr/>
           <a:lstStyle/>
           <a:p>
-            <a:endParaRPr lang="en-US"/>
+            <a:r>
+              <a:rPr lang="en-US" dirty="0" smtClean="0"/>
+              <a:t>Flow sensor compensation - Data</a:t>
+            </a:r>
+            <a:endParaRPr lang="en-US" dirty="0"/>
           </a:p>
         </p:txBody>
       </p:sp>
@@ -6941,8 +8407,8 @@
           </p:nvPr>
         </p:nvGraphicFramePr>
         <p:xfrm>
-          <a:off x="6172200" y="1825625"/>
-          <a:ext cx="5181600" cy="4351338"/>
+          <a:off x="6364288" y="2193925"/>
+          <a:ext cx="4754562" cy="3978275"/>
         </p:xfrm>
         <a:graphic>
           <a:graphicData uri="http://schemas.openxmlformats.org/drawingml/2006/chart">
@@ -7002,32 +8468,16 @@
           <a:bodyPr/>
           <a:lstStyle/>
           <a:p>
-            <a:endParaRPr lang="en-US"/>
+            <a:r>
+              <a:rPr lang="en-US" dirty="0"/>
+              <a:t>Flow sensor compensation - Data</a:t>
+            </a:r>
+            <a:endParaRPr lang="en-US" dirty="0"/>
           </a:p>
         </p:txBody>
       </p:sp>
-      <p:graphicFrame>
-        <p:nvGraphicFramePr>
-          <p:cNvPr id="5" name="Content Placeholder 4"/>
-          <p:cNvGraphicFramePr>
-            <a:graphicFrameLocks noGrp="1"/>
-          </p:cNvGraphicFramePr>
-          <p:nvPr>
-            <p:ph sz="half" idx="2"/>
-          </p:nvPr>
-        </p:nvGraphicFramePr>
-        <p:xfrm>
-          <a:off x="6172200" y="1825625"/>
-          <a:ext cx="5181600" cy="4351338"/>
-        </p:xfrm>
-        <a:graphic>
-          <a:graphicData uri="http://schemas.openxmlformats.org/drawingml/2006/chart">
-            <c:chart xmlns:c="http://schemas.openxmlformats.org/drawingml/2006/chart" xmlns:r="http://schemas.openxmlformats.org/officeDocument/2006/relationships" r:id="rId2"/>
-          </a:graphicData>
-        </a:graphic>
-      </p:graphicFrame>
-      <mc:AlternateContent xmlns:mc="http://schemas.openxmlformats.org/markup-compatibility/2006">
-        <mc:Choice xmlns:a14="http://schemas.microsoft.com/office/drawing/2010/main" Requires="a14">
+      <mc:AlternateContent xmlns:mc="http://schemas.openxmlformats.org/markup-compatibility/2006" xmlns:a14="http://schemas.microsoft.com/office/drawing/2010/main">
+        <mc:Choice Requires="a14">
           <p:sp>
             <p:nvSpPr>
               <p:cNvPr id="3" name="Content Placeholder 2"/>
@@ -7195,7 +8645,7 @@
             </p:txBody>
           </p:sp>
         </mc:Choice>
-        <mc:Fallback>
+        <mc:Fallback xmlns="">
           <p:sp>
             <p:nvSpPr>
               <p:cNvPr id="3" name="Content Placeholder 2"/>
@@ -7229,6 +8679,26 @@
           </p:sp>
         </mc:Fallback>
       </mc:AlternateContent>
+      <p:graphicFrame>
+        <p:nvGraphicFramePr>
+          <p:cNvPr id="5" name="Content Placeholder 4"/>
+          <p:cNvGraphicFramePr>
+            <a:graphicFrameLocks noGrp="1"/>
+          </p:cNvGraphicFramePr>
+          <p:nvPr>
+            <p:ph sz="half" idx="2"/>
+          </p:nvPr>
+        </p:nvGraphicFramePr>
+        <p:xfrm>
+          <a:off x="6364288" y="2193925"/>
+          <a:ext cx="4754562" cy="3978275"/>
+        </p:xfrm>
+        <a:graphic>
+          <a:graphicData uri="http://schemas.openxmlformats.org/drawingml/2006/chart">
+            <c:chart xmlns:c="http://schemas.openxmlformats.org/drawingml/2006/chart" xmlns:r="http://schemas.openxmlformats.org/officeDocument/2006/relationships" r:id="rId4"/>
+          </a:graphicData>
+        </a:graphic>
+      </p:graphicFrame>
     </p:spTree>
     <p:extLst>
       <p:ext uri="{BB962C8B-B14F-4D97-AF65-F5344CB8AC3E}">
@@ -7281,6 +8751,14 @@
           <a:bodyPr/>
           <a:lstStyle/>
           <a:p>
+            <a:r>
+              <a:rPr lang="en-US" dirty="0"/>
+              <a:t>Flow sensor compensation - </a:t>
+            </a:r>
+            <a:r>
+              <a:rPr lang="en-US" dirty="0" smtClean="0"/>
+              <a:t>Formula</a:t>
+            </a:r>
             <a:endParaRPr lang="en-US" dirty="0"/>
           </a:p>
         </p:txBody>
@@ -7300,7 +8778,7 @@
             <p:spPr/>
             <p:txBody>
               <a:bodyPr>
-                <a:normAutofit/>
+                <a:normAutofit fontScale="92500" lnSpcReduction="10000"/>
               </a:bodyPr>
               <a:lstStyle/>
               <a:p>
@@ -7879,7 +9357,7 @@
         <p:spPr/>
         <p:txBody>
           <a:bodyPr>
-            <a:normAutofit/>
+            <a:normAutofit fontScale="92500" lnSpcReduction="10000"/>
           </a:bodyPr>
           <a:lstStyle/>
           <a:p>
@@ -7909,8 +9387,8 @@
           </a:p>
         </p:txBody>
       </p:sp>
-      <mc:AlternateContent xmlns:mc="http://schemas.openxmlformats.org/markup-compatibility/2006">
-        <mc:Choice xmlns:a14="http://schemas.microsoft.com/office/drawing/2010/main" Requires="a14">
+      <mc:AlternateContent xmlns:mc="http://schemas.openxmlformats.org/markup-compatibility/2006" xmlns:a14="http://schemas.microsoft.com/office/drawing/2010/main">
+        <mc:Choice Requires="a14">
           <p:sp>
             <p:nvSpPr>
               <p:cNvPr id="5" name="TextBox 4"/>
@@ -7975,7 +9453,7 @@
             </p:txBody>
           </p:sp>
         </mc:Choice>
-        <mc:Fallback>
+        <mc:Fallback xmlns="">
           <p:sp>
             <p:nvSpPr>
               <p:cNvPr id="5" name="TextBox 4"/>
@@ -8053,63 +9531,6 @@
       </p:grpSpPr>
       <p:sp>
         <p:nvSpPr>
-          <p:cNvPr id="18" name="Rectangle 17"/>
-          <p:cNvSpPr>
-            <a:spLocks noGrp="1" noRot="1" noChangeAspect="1" noMove="1" noResize="1" noEditPoints="1" noAdjustHandles="1" noChangeArrowheads="1" noChangeShapeType="1" noTextEdit="1"/>
-          </p:cNvSpPr>
-          <p:nvPr>
-            <p:extLst>
-              <p:ext uri="{386F3935-93C4-4BCD-93E2-E3B085C9AB24}">
-                <p16:designElem xmlns:p16="http://schemas.microsoft.com/office/powerpoint/2015/main" val="1"/>
-              </p:ext>
-            </p:extLst>
-          </p:nvPr>
-        </p:nvSpPr>
-        <p:spPr bwMode="white">
-          <a:xfrm>
-            <a:off x="0" y="0"/>
-            <a:ext cx="12192000" cy="6858000"/>
-          </a:xfrm>
-          <a:prstGeom prst="rect">
-            <a:avLst/>
-          </a:prstGeom>
-          <a:solidFill>
-            <a:schemeClr val="bg1"/>
-          </a:solidFill>
-          <a:ln>
-            <a:noFill/>
-          </a:ln>
-          <a:effectLst/>
-        </p:spPr>
-      </p:sp>
-      <p:pic>
-        <p:nvPicPr>
-          <p:cNvPr id="6" name="Content Placeholder 5"/>
-          <p:cNvPicPr>
-            <a:picLocks noGrp="1" noChangeAspect="1"/>
-          </p:cNvPicPr>
-          <p:nvPr>
-            <p:ph sz="half" idx="2"/>
-          </p:nvPr>
-        </p:nvPicPr>
-        <p:blipFill rotWithShape="1">
-          <a:blip r:embed="rId2"/>
-          <a:srcRect r="16610" b="-2"/>
-          <a:stretch/>
-        </p:blipFill>
-        <p:spPr>
-          <a:xfrm>
-            <a:off x="4635799" y="861953"/>
-            <a:ext cx="6916329" cy="5577837"/>
-          </a:xfrm>
-          <a:prstGeom prst="rect">
-            <a:avLst/>
-          </a:prstGeom>
-          <a:effectLst/>
-        </p:spPr>
-      </p:pic>
-      <p:sp>
-        <p:nvSpPr>
           <p:cNvPr id="2" name="Title 1"/>
           <p:cNvSpPr>
             <a:spLocks noGrp="1"/>
@@ -8130,12 +9551,16 @@
           </a:bodyPr>
           <a:lstStyle/>
           <a:p>
-            <a:endParaRPr lang="en-US"/>
+            <a:r>
+              <a:rPr lang="en-US" dirty="0" smtClean="0"/>
+              <a:t>Formula</a:t>
+            </a:r>
+            <a:endParaRPr lang="en-US" dirty="0"/>
           </a:p>
         </p:txBody>
       </p:sp>
-      <mc:AlternateContent xmlns:mc="http://schemas.openxmlformats.org/markup-compatibility/2006">
-        <mc:Choice xmlns:a14="http://schemas.microsoft.com/office/drawing/2010/main" Requires="a14">
+      <mc:AlternateContent xmlns:mc="http://schemas.openxmlformats.org/markup-compatibility/2006" xmlns:a14="http://schemas.microsoft.com/office/drawing/2010/main">
+        <mc:Choice Requires="a14">
           <p:sp>
             <p:nvSpPr>
               <p:cNvPr id="3" name="Content Placeholder 2"/>
@@ -8670,7 +10095,7 @@
             </p:txBody>
           </p:sp>
         </mc:Choice>
-        <mc:Fallback>
+        <mc:Fallback xmlns="">
           <p:sp>
             <p:nvSpPr>
               <p:cNvPr id="3" name="Content Placeholder 2"/>
@@ -8710,6 +10135,32 @@
       </mc:AlternateContent>
       <p:pic>
         <p:nvPicPr>
+          <p:cNvPr id="6" name="Content Placeholder 5"/>
+          <p:cNvPicPr>
+            <a:picLocks noGrp="1" noChangeAspect="1"/>
+          </p:cNvPicPr>
+          <p:nvPr>
+            <p:ph sz="half" idx="2"/>
+          </p:nvPr>
+        </p:nvPicPr>
+        <p:blipFill rotWithShape="1">
+          <a:blip r:embed="rId4"/>
+          <a:srcRect r="16610" b="-2"/>
+          <a:stretch/>
+        </p:blipFill>
+        <p:spPr>
+          <a:xfrm>
+            <a:off x="4635799" y="861953"/>
+            <a:ext cx="6916329" cy="5577837"/>
+          </a:xfrm>
+          <a:prstGeom prst="rect">
+            <a:avLst/>
+          </a:prstGeom>
+          <a:effectLst/>
+        </p:spPr>
+      </p:pic>
+      <p:pic>
+        <p:nvPicPr>
           <p:cNvPr id="4" name="Picture 3"/>
           <p:cNvPicPr>
             <a:picLocks noChangeAspect="1"/>
@@ -8717,7 +10168,7 @@
           <p:nvPr/>
         </p:nvPicPr>
         <p:blipFill>
-          <a:blip r:embed="rId4"/>
+          <a:blip r:embed="rId5"/>
           <a:stretch>
             <a:fillRect/>
           </a:stretch>
@@ -8784,7 +10235,11 @@
           <a:bodyPr/>
           <a:lstStyle/>
           <a:p>
-            <a:endParaRPr lang="en-US"/>
+            <a:r>
+              <a:rPr lang="en-US" dirty="0" smtClean="0"/>
+              <a:t>App Design - Concepts</a:t>
+            </a:r>
+            <a:endParaRPr lang="en-US" dirty="0"/>
           </a:p>
         </p:txBody>
       </p:sp>
@@ -8800,7 +10255,9 @@
         </p:nvSpPr>
         <p:spPr/>
         <p:txBody>
-          <a:bodyPr/>
+          <a:bodyPr>
+            <a:normAutofit/>
+          </a:bodyPr>
           <a:lstStyle/>
           <a:p>
             <a:pPr fontAlgn="base"/>
@@ -8975,9 +10432,9 @@
 </file>
 
 <file path=ppt/theme/theme1.xml><?xml version="1.0" encoding="utf-8"?>
-<a:theme xmlns:a="http://schemas.openxmlformats.org/drawingml/2006/main" name="Office Theme">
+<a:theme xmlns:a="http://schemas.openxmlformats.org/drawingml/2006/main" name="Wood Type">
   <a:themeElements>
-    <a:clrScheme name="Office">
+    <a:clrScheme name="Wood Type">
       <a:dk1>
         <a:sysClr val="windowText" lastClr="000000"/>
       </a:dk1>
@@ -8985,48 +10442,86 @@
         <a:sysClr val="window" lastClr="FFFFFF"/>
       </a:lt1>
       <a:dk2>
-        <a:srgbClr val="44546A"/>
+        <a:srgbClr val="696464"/>
       </a:dk2>
       <a:lt2>
-        <a:srgbClr val="E7E6E6"/>
+        <a:srgbClr val="E9E5DC"/>
       </a:lt2>
       <a:accent1>
-        <a:srgbClr val="4472C4"/>
+        <a:srgbClr val="D34817"/>
       </a:accent1>
       <a:accent2>
-        <a:srgbClr val="ED7D31"/>
+        <a:srgbClr val="9B2D1F"/>
       </a:accent2>
       <a:accent3>
-        <a:srgbClr val="A5A5A5"/>
+        <a:srgbClr val="A28E6A"/>
       </a:accent3>
       <a:accent4>
-        <a:srgbClr val="FFC000"/>
+        <a:srgbClr val="956251"/>
       </a:accent4>
       <a:accent5>
-        <a:srgbClr val="5B9BD5"/>
+        <a:srgbClr val="918485"/>
       </a:accent5>
       <a:accent6>
-        <a:srgbClr val="70AD47"/>
+        <a:srgbClr val="855D5D"/>
       </a:accent6>
       <a:hlink>
-        <a:srgbClr val="0563C1"/>
+        <a:srgbClr val="CC9900"/>
       </a:hlink>
       <a:folHlink>
-        <a:srgbClr val="954F72"/>
+        <a:srgbClr val="96A9A9"/>
       </a:folHlink>
     </a:clrScheme>
-    <a:fontScheme name="Office">
+    <a:fontScheme name="Wood Type">
       <a:majorFont>
-        <a:latin typeface="Calibri Light" panose="020F0302020204030204"/>
+        <a:latin typeface="Rockwell Condensed" panose="02060603050405020104"/>
         <a:ea typeface=""/>
         <a:cs typeface=""/>
-        <a:font script="Jpan" typeface="Yu Gothic Light"/>
-        <a:font script="Hang" typeface="맑은 고딕"/>
-        <a:font script="Hans" typeface="DengXian Light"/>
-        <a:font script="Hant" typeface="新細明體"/>
+        <a:font script="Grek" typeface="Cambria"/>
+        <a:font script="Cyrl" typeface="Cambria"/>
+        <a:font script="Jpan" typeface="HG明朝B"/>
+        <a:font script="Hang" typeface="바탕"/>
+        <a:font script="Hans" typeface="方正姚体"/>
+        <a:font script="Hant" typeface="微軟正黑體"/>
         <a:font script="Arab" typeface="Times New Roman"/>
-        <a:font script="Hebr" typeface="Times New Roman"/>
-        <a:font script="Thai" typeface="Angsana New"/>
+        <a:font script="Hebr" typeface="David"/>
+        <a:font script="Thai" typeface="JasmineUPC"/>
+        <a:font script="Ethi" typeface="Nyala"/>
+        <a:font script="Beng" typeface="Vrinda"/>
+        <a:font script="Gujr" typeface="Shruti"/>
+        <a:font script="Khmr" typeface="MoolBoran"/>
+        <a:font script="Knda" typeface="Tunga"/>
+        <a:font script="Guru" typeface="Raavi"/>
+        <a:font script="Cans" typeface="Euphemia"/>
+        <a:font script="Cher" typeface="Plantagenet Cherokee"/>
+        <a:font script="Yiii" typeface="Microsoft Yi Baiti"/>
+        <a:font script="Tibt" typeface="Microsoft Himalaya"/>
+        <a:font script="Thaa" typeface="MV Boli"/>
+        <a:font script="Deva" typeface="Mangal"/>
+        <a:font script="Telu" typeface="Gautami"/>
+        <a:font script="Taml" typeface="Latha"/>
+        <a:font script="Syrc" typeface="Estrangelo Edessa"/>
+        <a:font script="Orya" typeface="Kalinga"/>
+        <a:font script="Mlym" typeface="Kartika"/>
+        <a:font script="Laoo" typeface="DokChampa"/>
+        <a:font script="Sinh" typeface="Iskoola Pota"/>
+        <a:font script="Mong" typeface="Mongolian Baiti"/>
+        <a:font script="Viet" typeface="Arial"/>
+        <a:font script="Uigh" typeface="Microsoft Uighur"/>
+      </a:majorFont>
+      <a:minorFont>
+        <a:latin typeface="Rockwell" panose="02060603020205020403"/>
+        <a:ea typeface=""/>
+        <a:cs typeface=""/>
+        <a:font script="Grek" typeface="Cambria"/>
+        <a:font script="Cyrl" typeface="Cambria"/>
+        <a:font script="Jpan" typeface="HG明朝B"/>
+        <a:font script="Hang" typeface="바탕"/>
+        <a:font script="Hans" typeface="方正姚体"/>
+        <a:font script="Hant" typeface="標楷體"/>
+        <a:font script="Arab" typeface="Times New Roman"/>
+        <a:font script="Hebr" typeface="David"/>
+        <a:font script="Thai" typeface="JasmineUPC"/>
         <a:font script="Ethi" typeface="Nyala"/>
         <a:font script="Beng" typeface="Vrinda"/>
         <a:font script="Gujr" typeface="Shruti"/>
@@ -9049,101 +10544,42 @@
         <a:font script="Mong" typeface="Mongolian Baiti"/>
         <a:font script="Viet" typeface="Times New Roman"/>
         <a:font script="Uigh" typeface="Microsoft Uighur"/>
-        <a:font script="Geor" typeface="Sylfaen"/>
-      </a:majorFont>
-      <a:minorFont>
-        <a:latin typeface="Calibri" panose="020F0502020204030204"/>
-        <a:ea typeface=""/>
-        <a:cs typeface=""/>
-        <a:font script="Jpan" typeface="Yu Gothic"/>
-        <a:font script="Hang" typeface="맑은 고딕"/>
-        <a:font script="Hans" typeface="DengXian"/>
-        <a:font script="Hant" typeface="新細明體"/>
-        <a:font script="Arab" typeface="Arial"/>
-        <a:font script="Hebr" typeface="Arial"/>
-        <a:font script="Thai" typeface="Cordia New"/>
-        <a:font script="Ethi" typeface="Nyala"/>
-        <a:font script="Beng" typeface="Vrinda"/>
-        <a:font script="Gujr" typeface="Shruti"/>
-        <a:font script="Khmr" typeface="DaunPenh"/>
-        <a:font script="Knda" typeface="Tunga"/>
-        <a:font script="Guru" typeface="Raavi"/>
-        <a:font script="Cans" typeface="Euphemia"/>
-        <a:font script="Cher" typeface="Plantagenet Cherokee"/>
-        <a:font script="Yiii" typeface="Microsoft Yi Baiti"/>
-        <a:font script="Tibt" typeface="Microsoft Himalaya"/>
-        <a:font script="Thaa" typeface="MV Boli"/>
-        <a:font script="Deva" typeface="Mangal"/>
-        <a:font script="Telu" typeface="Gautami"/>
-        <a:font script="Taml" typeface="Latha"/>
-        <a:font script="Syrc" typeface="Estrangelo Edessa"/>
-        <a:font script="Orya" typeface="Kalinga"/>
-        <a:font script="Mlym" typeface="Kartika"/>
-        <a:font script="Laoo" typeface="DokChampa"/>
-        <a:font script="Sinh" typeface="Iskoola Pota"/>
-        <a:font script="Mong" typeface="Mongolian Baiti"/>
-        <a:font script="Viet" typeface="Arial"/>
-        <a:font script="Uigh" typeface="Microsoft Uighur"/>
-        <a:font script="Geor" typeface="Sylfaen"/>
       </a:minorFont>
     </a:fontScheme>
-    <a:fmtScheme name="Office">
+    <a:fmtScheme name="Wood Type">
       <a:fillStyleLst>
         <a:solidFill>
           <a:schemeClr val="phClr"/>
         </a:solidFill>
-        <a:gradFill rotWithShape="1">
-          <a:gsLst>
-            <a:gs pos="0">
+        <a:blipFill rotWithShape="1">
+          <a:blip xmlns:r="http://schemas.openxmlformats.org/officeDocument/2006/relationships" r:embed="rId1">
+            <a:duotone>
               <a:schemeClr val="phClr">
-                <a:lumMod val="110000"/>
-                <a:satMod val="105000"/>
-                <a:tint val="67000"/>
+                <a:tint val="70000"/>
+                <a:shade val="63000"/>
               </a:schemeClr>
-            </a:gs>
-            <a:gs pos="50000">
               <a:schemeClr val="phClr">
-                <a:lumMod val="105000"/>
-                <a:satMod val="103000"/>
-                <a:tint val="73000"/>
+                <a:tint val="10000"/>
+                <a:satMod val="150000"/>
               </a:schemeClr>
-            </a:gs>
-            <a:gs pos="100000">
+            </a:duotone>
+          </a:blip>
+          <a:tile tx="0" ty="0" sx="60000" sy="59000" flip="none" algn="tl"/>
+        </a:blipFill>
+        <a:blipFill rotWithShape="1">
+          <a:blip xmlns:r="http://schemas.openxmlformats.org/officeDocument/2006/relationships" r:embed="rId1">
+            <a:duotone>
               <a:schemeClr val="phClr">
-                <a:lumMod val="105000"/>
-                <a:satMod val="109000"/>
-                <a:tint val="81000"/>
+                <a:shade val="36000"/>
+                <a:satMod val="120000"/>
               </a:schemeClr>
-            </a:gs>
-          </a:gsLst>
-          <a:lin ang="5400000" scaled="0"/>
-        </a:gradFill>
-        <a:gradFill rotWithShape="1">
-          <a:gsLst>
-            <a:gs pos="0">
               <a:schemeClr val="phClr">
-                <a:satMod val="103000"/>
-                <a:lumMod val="102000"/>
-                <a:tint val="94000"/>
+                <a:tint val="40000"/>
               </a:schemeClr>
-            </a:gs>
-            <a:gs pos="50000">
-              <a:schemeClr val="phClr">
-                <a:satMod val="110000"/>
-                <a:lumMod val="100000"/>
-                <a:shade val="100000"/>
-              </a:schemeClr>
-            </a:gs>
-            <a:gs pos="100000">
-              <a:schemeClr val="phClr">
-                <a:lumMod val="99000"/>
-                <a:satMod val="120000"/>
-                <a:shade val="78000"/>
-              </a:schemeClr>
-            </a:gs>
-          </a:gsLst>
-          <a:lin ang="5400000" scaled="0"/>
-        </a:gradFill>
+            </a:duotone>
+          </a:blip>
+          <a:tile tx="0" ty="0" sx="60000" sy="59000" flip="none" algn="tl"/>
+        </a:blipFill>
       </a:fillStyleLst>
       <a:lnStyleLst>
         <a:ln w="6350" cap="flat" cmpd="sng" algn="ctr">
@@ -9151,21 +10587,18 @@
             <a:schemeClr val="phClr"/>
           </a:solidFill>
           <a:prstDash val="solid"/>
-          <a:miter lim="800000"/>
         </a:ln>
         <a:ln w="12700" cap="flat" cmpd="sng" algn="ctr">
           <a:solidFill>
             <a:schemeClr val="phClr"/>
           </a:solidFill>
           <a:prstDash val="solid"/>
-          <a:miter lim="800000"/>
         </a:ln>
         <a:ln w="19050" cap="flat" cmpd="sng" algn="ctr">
           <a:solidFill>
             <a:schemeClr val="phClr"/>
           </a:solidFill>
           <a:prstDash val="solid"/>
-          <a:miter lim="800000"/>
         </a:ln>
       </a:lnStyleLst>
       <a:effectStyleLst>
@@ -9173,15 +10606,18 @@
           <a:effectLst/>
         </a:effectStyle>
         <a:effectStyle>
-          <a:effectLst/>
+          <a:effectLst>
+            <a:softEdge rad="12700"/>
+          </a:effectLst>
         </a:effectStyle>
         <a:effectStyle>
           <a:effectLst>
-            <a:outerShdw blurRad="57150" dist="19050" dir="5400000" algn="ctr" rotWithShape="0">
+            <a:outerShdw blurRad="50800" dist="19050" dir="5400000" algn="tl" rotWithShape="0">
               <a:srgbClr val="000000">
-                <a:alpha val="63000"/>
+                <a:alpha val="60000"/>
               </a:srgbClr>
             </a:outerShdw>
+            <a:softEdge rad="12700"/>
           </a:effectLst>
         </a:effectStyle>
       </a:effectStyleLst>
@@ -9191,37 +10627,26 @@
         </a:solidFill>
         <a:solidFill>
           <a:schemeClr val="phClr">
-            <a:tint val="95000"/>
-            <a:satMod val="170000"/>
+            <a:shade val="97000"/>
+            <a:satMod val="150000"/>
           </a:schemeClr>
         </a:solidFill>
-        <a:gradFill rotWithShape="1">
-          <a:gsLst>
-            <a:gs pos="0">
+        <a:blipFill rotWithShape="1">
+          <a:blip xmlns:r="http://schemas.openxmlformats.org/officeDocument/2006/relationships" r:embed="rId1">
+            <a:duotone>
               <a:schemeClr val="phClr">
-                <a:tint val="93000"/>
-                <a:satMod val="150000"/>
-                <a:shade val="98000"/>
-                <a:lumMod val="102000"/>
-              </a:schemeClr>
-            </a:gs>
-            <a:gs pos="50000">
-              <a:schemeClr val="phClr">
-                <a:tint val="98000"/>
-                <a:satMod val="130000"/>
-                <a:shade val="90000"/>
-                <a:lumMod val="103000"/>
-              </a:schemeClr>
-            </a:gs>
-            <a:gs pos="100000">
-              <a:schemeClr val="phClr">
-                <a:shade val="63000"/>
+                <a:tint val="75000"/>
+                <a:shade val="58000"/>
                 <a:satMod val="120000"/>
               </a:schemeClr>
-            </a:gs>
-          </a:gsLst>
-          <a:lin ang="5400000" scaled="0"/>
-        </a:gradFill>
+              <a:schemeClr val="phClr">
+                <a:tint val="50000"/>
+                <a:shade val="96000"/>
+              </a:schemeClr>
+            </a:duotone>
+          </a:blip>
+          <a:tile tx="0" ty="0" sx="100000" sy="100000" flip="none" algn="tl"/>
+        </a:blipFill>
       </a:bgFillStyleLst>
     </a:fmtScheme>
   </a:themeElements>
@@ -9229,7 +10654,7 @@
   <a:extraClrSchemeLst/>
   <a:extLst>
     <a:ext uri="{05A4C25C-085E-4340-85A3-A5531E510DB2}">
-      <thm15:themeFamily xmlns:thm15="http://schemas.microsoft.com/office/thememl/2012/main" name="Office Theme" id="{62F939B6-93AF-4DB8-9C6B-D6C7DFDC589F}" vid="{4A3C46E8-61CC-4603-A589-7422A47A8E4A}"/>
+      <thm15:themeFamily xmlns:thm15="http://schemas.microsoft.com/office/thememl/2012/main" name="Wood Type" id="{7ACABC62-BF99-48CF-A9DC-4DB89C7B13DC}" vid="{142A1326-48AB-42A9-8428-CB14AA30176D}"/>
     </a:ext>
   </a:extLst>
 </a:theme>

</xml_diff>